<commit_message>
Remove equalize angle within second shape
</commit_message>
<xml_diff>
--- a/doc/test/PositionsLab/PositionsLabDistributeAngle.pptx
+++ b/doc/test/PositionsLab/PositionsLabDistributeAngle.pptx
@@ -13,13 +13,10 @@
     <p:sldId id="292" r:id="rId7"/>
     <p:sldId id="305" r:id="rId8"/>
     <p:sldId id="300" r:id="rId9"/>
-    <p:sldId id="299" r:id="rId10"/>
-    <p:sldId id="301" r:id="rId11"/>
-    <p:sldId id="302" r:id="rId12"/>
-    <p:sldId id="298" r:id="rId13"/>
-    <p:sldId id="303" r:id="rId14"/>
-    <p:sldId id="304" r:id="rId15"/>
-    <p:sldId id="274" r:id="rId16"/>
+    <p:sldId id="298" r:id="rId10"/>
+    <p:sldId id="303" r:id="rId11"/>
+    <p:sldId id="304" r:id="rId12"/>
+    <p:sldId id="274" r:id="rId13"/>
   </p:sldIdLst>
   <p:sldSz cx="9144000" cy="6858000" type="screen4x3"/>
   <p:notesSz cx="6858000" cy="9144000"/>
@@ -133,9 +130,6 @@
             <p14:sldId id="292"/>
             <p14:sldId id="305"/>
             <p14:sldId id="300"/>
-            <p14:sldId id="299"/>
-            <p14:sldId id="301"/>
-            <p14:sldId id="302"/>
             <p14:sldId id="298"/>
             <p14:sldId id="303"/>
             <p14:sldId id="304"/>
@@ -330,7 +324,7 @@
           <a:p>
             <a:fld id="{699DC775-C286-4358-8C92-D7E584E969B3}" type="datetimeFigureOut">
               <a:rPr lang="en-US" smtClean="0"/>
-              <a:t>2016/06/13</a:t>
+              <a:t>6/16/2016</a:t>
             </a:fld>
             <a:endParaRPr lang="en-US"/>
           </a:p>
@@ -498,7 +492,7 @@
           <a:p>
             <a:fld id="{699DC775-C286-4358-8C92-D7E584E969B3}" type="datetimeFigureOut">
               <a:rPr lang="en-US" smtClean="0"/>
-              <a:t>2016/06/13</a:t>
+              <a:t>6/16/2016</a:t>
             </a:fld>
             <a:endParaRPr lang="en-US"/>
           </a:p>
@@ -676,7 +670,7 @@
           <a:p>
             <a:fld id="{699DC775-C286-4358-8C92-D7E584E969B3}" type="datetimeFigureOut">
               <a:rPr lang="en-US" smtClean="0"/>
-              <a:t>2016/06/13</a:t>
+              <a:t>6/16/2016</a:t>
             </a:fld>
             <a:endParaRPr lang="en-US"/>
           </a:p>
@@ -916,7 +910,7 @@
           <a:p>
             <a:fld id="{699DC775-C286-4358-8C92-D7E584E969B3}" type="datetimeFigureOut">
               <a:rPr lang="en-US" smtClean="0"/>
-              <a:t>2016/06/13</a:t>
+              <a:t>6/16/2016</a:t>
             </a:fld>
             <a:endParaRPr lang="en-US"/>
           </a:p>
@@ -1084,7 +1078,7 @@
           <a:p>
             <a:fld id="{699DC775-C286-4358-8C92-D7E584E969B3}" type="datetimeFigureOut">
               <a:rPr lang="en-US" smtClean="0"/>
-              <a:t>2016/06/13</a:t>
+              <a:t>6/16/2016</a:t>
             </a:fld>
             <a:endParaRPr lang="en-US"/>
           </a:p>
@@ -1329,7 +1323,7 @@
           <a:p>
             <a:fld id="{699DC775-C286-4358-8C92-D7E584E969B3}" type="datetimeFigureOut">
               <a:rPr lang="en-US" smtClean="0"/>
-              <a:t>2016/06/13</a:t>
+              <a:t>6/16/2016</a:t>
             </a:fld>
             <a:endParaRPr lang="en-US"/>
           </a:p>
@@ -1614,7 +1608,7 @@
           <a:p>
             <a:fld id="{699DC775-C286-4358-8C92-D7E584E969B3}" type="datetimeFigureOut">
               <a:rPr lang="en-US" smtClean="0"/>
-              <a:t>2016/06/13</a:t>
+              <a:t>6/16/2016</a:t>
             </a:fld>
             <a:endParaRPr lang="en-US"/>
           </a:p>
@@ -2033,7 +2027,7 @@
           <a:p>
             <a:fld id="{699DC775-C286-4358-8C92-D7E584E969B3}" type="datetimeFigureOut">
               <a:rPr lang="en-US" smtClean="0"/>
-              <a:t>2016/06/13</a:t>
+              <a:t>6/16/2016</a:t>
             </a:fld>
             <a:endParaRPr lang="en-US"/>
           </a:p>
@@ -2150,7 +2144,7 @@
           <a:p>
             <a:fld id="{699DC775-C286-4358-8C92-D7E584E969B3}" type="datetimeFigureOut">
               <a:rPr lang="en-US" smtClean="0"/>
-              <a:t>2016/06/13</a:t>
+              <a:t>6/16/2016</a:t>
             </a:fld>
             <a:endParaRPr lang="en-US"/>
           </a:p>
@@ -2245,7 +2239,7 @@
           <a:p>
             <a:fld id="{699DC775-C286-4358-8C92-D7E584E969B3}" type="datetimeFigureOut">
               <a:rPr lang="en-US" smtClean="0"/>
-              <a:t>2016/06/13</a:t>
+              <a:t>6/16/2016</a:t>
             </a:fld>
             <a:endParaRPr lang="en-US"/>
           </a:p>
@@ -2520,7 +2514,7 @@
           <a:p>
             <a:fld id="{699DC775-C286-4358-8C92-D7E584E969B3}" type="datetimeFigureOut">
               <a:rPr lang="en-US" smtClean="0"/>
-              <a:t>2016/06/13</a:t>
+              <a:t>6/16/2016</a:t>
             </a:fld>
             <a:endParaRPr lang="en-US"/>
           </a:p>
@@ -2688,7 +2682,7 @@
           <a:p>
             <a:fld id="{699DC775-C286-4358-8C92-D7E584E969B3}" type="datetimeFigureOut">
               <a:rPr lang="en-US" smtClean="0"/>
-              <a:t>2016/06/13</a:t>
+              <a:t>6/16/2016</a:t>
             </a:fld>
             <a:endParaRPr lang="en-US"/>
           </a:p>
@@ -2940,7 +2934,7 @@
           <a:p>
             <a:fld id="{699DC775-C286-4358-8C92-D7E584E969B3}" type="datetimeFigureOut">
               <a:rPr lang="en-US" smtClean="0"/>
-              <a:t>2016/06/13</a:t>
+              <a:t>6/16/2016</a:t>
             </a:fld>
             <a:endParaRPr lang="en-US"/>
           </a:p>
@@ -3108,7 +3102,7 @@
           <a:p>
             <a:fld id="{699DC775-C286-4358-8C92-D7E584E969B3}" type="datetimeFigureOut">
               <a:rPr lang="en-US" smtClean="0"/>
-              <a:t>2016/06/13</a:t>
+              <a:t>6/16/2016</a:t>
             </a:fld>
             <a:endParaRPr lang="en-US"/>
           </a:p>
@@ -3286,7 +3280,7 @@
           <a:p>
             <a:fld id="{699DC775-C286-4358-8C92-D7E584E969B3}" type="datetimeFigureOut">
               <a:rPr lang="en-US" smtClean="0"/>
-              <a:t>2016/06/13</a:t>
+              <a:t>6/16/2016</a:t>
             </a:fld>
             <a:endParaRPr lang="en-US"/>
           </a:p>
@@ -3534,7 +3528,7 @@
           <a:p>
             <a:fld id="{699DC775-C286-4358-8C92-D7E584E969B3}" type="datetimeFigureOut">
               <a:rPr lang="en-US" smtClean="0"/>
-              <a:t>2016/06/13</a:t>
+              <a:t>6/16/2016</a:t>
             </a:fld>
             <a:endParaRPr lang="en-US"/>
           </a:p>
@@ -3710,7 +3704,7 @@
           <a:p>
             <a:fld id="{699DC775-C286-4358-8C92-D7E584E969B3}" type="datetimeFigureOut">
               <a:rPr lang="en-US" smtClean="0"/>
-              <a:t>2016/06/13</a:t>
+              <a:t>6/16/2016</a:t>
             </a:fld>
             <a:endParaRPr lang="en-US"/>
           </a:p>
@@ -3963,7 +3957,7 @@
           <a:p>
             <a:fld id="{699DC775-C286-4358-8C92-D7E584E969B3}" type="datetimeFigureOut">
               <a:rPr lang="en-US" smtClean="0"/>
-              <a:t>2016/06/13</a:t>
+              <a:t>6/16/2016</a:t>
             </a:fld>
             <a:endParaRPr lang="en-US"/>
           </a:p>
@@ -4256,7 +4250,7 @@
           <a:p>
             <a:fld id="{699DC775-C286-4358-8C92-D7E584E969B3}" type="datetimeFigureOut">
               <a:rPr lang="en-US" smtClean="0"/>
-              <a:t>2016/06/13</a:t>
+              <a:t>6/16/2016</a:t>
             </a:fld>
             <a:endParaRPr lang="en-US"/>
           </a:p>
@@ -4683,7 +4677,7 @@
           <a:p>
             <a:fld id="{699DC775-C286-4358-8C92-D7E584E969B3}" type="datetimeFigureOut">
               <a:rPr lang="en-US" smtClean="0"/>
-              <a:t>2016/06/13</a:t>
+              <a:t>6/16/2016</a:t>
             </a:fld>
             <a:endParaRPr lang="en-US"/>
           </a:p>
@@ -4808,7 +4802,7 @@
           <a:p>
             <a:fld id="{699DC775-C286-4358-8C92-D7E584E969B3}" type="datetimeFigureOut">
               <a:rPr lang="en-US" smtClean="0"/>
-              <a:t>2016/06/13</a:t>
+              <a:t>6/16/2016</a:t>
             </a:fld>
             <a:endParaRPr lang="en-US"/>
           </a:p>
@@ -4911,7 +4905,7 @@
           <a:p>
             <a:fld id="{699DC775-C286-4358-8C92-D7E584E969B3}" type="datetimeFigureOut">
               <a:rPr lang="en-US" smtClean="0"/>
-              <a:t>2016/06/13</a:t>
+              <a:t>6/16/2016</a:t>
             </a:fld>
             <a:endParaRPr lang="en-US"/>
           </a:p>
@@ -5156,7 +5150,7 @@
           <a:p>
             <a:fld id="{699DC775-C286-4358-8C92-D7E584E969B3}" type="datetimeFigureOut">
               <a:rPr lang="en-US" smtClean="0"/>
-              <a:t>2016/06/13</a:t>
+              <a:t>6/16/2016</a:t>
             </a:fld>
             <a:endParaRPr lang="en-US"/>
           </a:p>
@@ -5439,7 +5433,7 @@
           <a:p>
             <a:fld id="{699DC775-C286-4358-8C92-D7E584E969B3}" type="datetimeFigureOut">
               <a:rPr lang="en-US" smtClean="0"/>
-              <a:t>2016/06/13</a:t>
+              <a:t>6/16/2016</a:t>
             </a:fld>
             <a:endParaRPr lang="en-US"/>
           </a:p>
@@ -5699,7 +5693,7 @@
           <a:p>
             <a:fld id="{699DC775-C286-4358-8C92-D7E584E969B3}" type="datetimeFigureOut">
               <a:rPr lang="en-US" smtClean="0"/>
-              <a:t>2016/06/13</a:t>
+              <a:t>6/16/2016</a:t>
             </a:fld>
             <a:endParaRPr lang="en-US"/>
           </a:p>
@@ -5875,7 +5869,7 @@
           <a:p>
             <a:fld id="{699DC775-C286-4358-8C92-D7E584E969B3}" type="datetimeFigureOut">
               <a:rPr lang="en-US" smtClean="0"/>
-              <a:t>2016/06/13</a:t>
+              <a:t>6/16/2016</a:t>
             </a:fld>
             <a:endParaRPr lang="en-US"/>
           </a:p>
@@ -6061,7 +6055,7 @@
           <a:p>
             <a:fld id="{699DC775-C286-4358-8C92-D7E584E969B3}" type="datetimeFigureOut">
               <a:rPr lang="en-US" smtClean="0"/>
-              <a:t>2016/06/13</a:t>
+              <a:t>6/16/2016</a:t>
             </a:fld>
             <a:endParaRPr lang="en-US"/>
           </a:p>
@@ -6346,7 +6340,7 @@
           <a:p>
             <a:fld id="{699DC775-C286-4358-8C92-D7E584E969B3}" type="datetimeFigureOut">
               <a:rPr lang="en-US" smtClean="0"/>
-              <a:t>2016/06/13</a:t>
+              <a:t>6/16/2016</a:t>
             </a:fld>
             <a:endParaRPr lang="en-US"/>
           </a:p>
@@ -6765,7 +6759,7 @@
           <a:p>
             <a:fld id="{699DC775-C286-4358-8C92-D7E584E969B3}" type="datetimeFigureOut">
               <a:rPr lang="en-US" smtClean="0"/>
-              <a:t>2016/06/13</a:t>
+              <a:t>6/16/2016</a:t>
             </a:fld>
             <a:endParaRPr lang="en-US"/>
           </a:p>
@@ -6882,7 +6876,7 @@
           <a:p>
             <a:fld id="{699DC775-C286-4358-8C92-D7E584E969B3}" type="datetimeFigureOut">
               <a:rPr lang="en-US" smtClean="0"/>
-              <a:t>2016/06/13</a:t>
+              <a:t>6/16/2016</a:t>
             </a:fld>
             <a:endParaRPr lang="en-US"/>
           </a:p>
@@ -6977,7 +6971,7 @@
           <a:p>
             <a:fld id="{699DC775-C286-4358-8C92-D7E584E969B3}" type="datetimeFigureOut">
               <a:rPr lang="en-US" smtClean="0"/>
-              <a:t>2016/06/13</a:t>
+              <a:t>6/16/2016</a:t>
             </a:fld>
             <a:endParaRPr lang="en-US"/>
           </a:p>
@@ -7252,7 +7246,7 @@
           <a:p>
             <a:fld id="{699DC775-C286-4358-8C92-D7E584E969B3}" type="datetimeFigureOut">
               <a:rPr lang="en-US" smtClean="0"/>
-              <a:t>2016/06/13</a:t>
+              <a:t>6/16/2016</a:t>
             </a:fld>
             <a:endParaRPr lang="en-US"/>
           </a:p>
@@ -7504,7 +7498,7 @@
           <a:p>
             <a:fld id="{699DC775-C286-4358-8C92-D7E584E969B3}" type="datetimeFigureOut">
               <a:rPr lang="en-US" smtClean="0"/>
-              <a:t>2016/06/13</a:t>
+              <a:t>6/16/2016</a:t>
             </a:fld>
             <a:endParaRPr lang="en-US"/>
           </a:p>
@@ -7715,7 +7709,7 @@
           <a:p>
             <a:fld id="{699DC775-C286-4358-8C92-D7E584E969B3}" type="datetimeFigureOut">
               <a:rPr lang="en-US" smtClean="0"/>
-              <a:t>2016/06/13</a:t>
+              <a:t>6/16/2016</a:t>
             </a:fld>
             <a:endParaRPr lang="en-US"/>
           </a:p>
@@ -8228,7 +8222,7 @@
           <a:p>
             <a:fld id="{699DC775-C286-4358-8C92-D7E584E969B3}" type="datetimeFigureOut">
               <a:rPr lang="en-US" smtClean="0"/>
-              <a:t>2016/06/13</a:t>
+              <a:t>6/16/2016</a:t>
             </a:fld>
             <a:endParaRPr lang="en-US"/>
           </a:p>
@@ -8739,7 +8733,7 @@
           <a:p>
             <a:fld id="{699DC775-C286-4358-8C92-D7E584E969B3}" type="datetimeFigureOut">
               <a:rPr lang="en-US" smtClean="0"/>
-              <a:t>2016/06/13</a:t>
+              <a:t>6/16/2016</a:t>
             </a:fld>
             <a:endParaRPr lang="en-US"/>
           </a:p>
@@ -9242,1288 +9236,6 @@
 </file>
 
 <file path=ppt/slides/slide10.xml><?xml version="1.0" encoding="utf-8"?>
-<p:sld xmlns:a="http://schemas.openxmlformats.org/drawingml/2006/main" xmlns:r="http://schemas.openxmlformats.org/officeDocument/2006/relationships" xmlns:p="http://schemas.openxmlformats.org/presentationml/2006/main">
-  <p:cSld>
-    <p:spTree>
-      <p:nvGrpSpPr>
-        <p:cNvPr id="1" name=""/>
-        <p:cNvGrpSpPr/>
-        <p:nvPr/>
-      </p:nvGrpSpPr>
-      <p:grpSpPr>
-        <a:xfrm>
-          <a:off x="0" y="0"/>
-          <a:ext cx="0" cy="0"/>
-          <a:chOff x="0" y="0"/>
-          <a:chExt cx="0" cy="0"/>
-        </a:xfrm>
-      </p:grpSpPr>
-      <p:sp>
-        <p:nvSpPr>
-          <p:cNvPr id="2" name="Title 1"/>
-          <p:cNvSpPr>
-            <a:spLocks noGrp="1"/>
-          </p:cNvSpPr>
-          <p:nvPr>
-            <p:ph type="title"/>
-          </p:nvPr>
-        </p:nvSpPr>
-        <p:spPr/>
-        <p:txBody>
-          <a:bodyPr/>
-          <a:lstStyle/>
-          <a:p>
-            <a:r>
-              <a:rPr lang="en-US" dirty="0"/>
-              <a:t>Distribute:: </a:t>
-            </a:r>
-            <a:r>
-              <a:rPr lang="en-US" dirty="0" smtClean="0"/>
-              <a:t>Angle / Second </a:t>
-            </a:r>
-            <a:r>
-              <a:rPr lang="en-US" smtClean="0"/>
-              <a:t>and Third</a:t>
-            </a:r>
-            <a:endParaRPr lang="en-SG" dirty="0"/>
-          </a:p>
-        </p:txBody>
-      </p:sp>
-      <p:sp>
-        <p:nvSpPr>
-          <p:cNvPr id="3" name="Content Placeholder 2"/>
-          <p:cNvSpPr>
-            <a:spLocks noGrp="1"/>
-          </p:cNvSpPr>
-          <p:nvPr>
-            <p:ph idx="1"/>
-          </p:nvPr>
-        </p:nvSpPr>
-        <p:spPr/>
-        <p:txBody>
-          <a:bodyPr/>
-          <a:lstStyle/>
-          <a:p>
-            <a:endParaRPr lang="en-SG" dirty="0"/>
-          </a:p>
-        </p:txBody>
-      </p:sp>
-    </p:spTree>
-    <p:extLst>
-      <p:ext uri="{BB962C8B-B14F-4D97-AF65-F5344CB8AC3E}">
-        <p14:creationId xmlns:p14="http://schemas.microsoft.com/office/powerpoint/2010/main" val="2602621610"/>
-      </p:ext>
-    </p:extLst>
-  </p:cSld>
-  <p:clrMapOvr>
-    <a:masterClrMapping/>
-  </p:clrMapOvr>
-</p:sld>
-</file>
-
-<file path=ppt/slides/slide11.xml><?xml version="1.0" encoding="utf-8"?>
-<p:sld xmlns:a="http://schemas.openxmlformats.org/drawingml/2006/main" xmlns:r="http://schemas.openxmlformats.org/officeDocument/2006/relationships" xmlns:p="http://schemas.openxmlformats.org/presentationml/2006/main">
-  <p:cSld>
-    <p:spTree>
-      <p:nvGrpSpPr>
-        <p:cNvPr id="1" name=""/>
-        <p:cNvGrpSpPr/>
-        <p:nvPr/>
-      </p:nvGrpSpPr>
-      <p:grpSpPr>
-        <a:xfrm>
-          <a:off x="0" y="0"/>
-          <a:ext cx="0" cy="0"/>
-          <a:chOff x="0" y="0"/>
-          <a:chExt cx="0" cy="0"/>
-        </a:xfrm>
-      </p:grpSpPr>
-      <p:sp>
-        <p:nvSpPr>
-          <p:cNvPr id="3" name="Pie 2"/>
-          <p:cNvSpPr/>
-          <p:nvPr/>
-        </p:nvSpPr>
-        <p:spPr>
-          <a:xfrm rot="20747556">
-            <a:off x="2439622" y="1097421"/>
-            <a:ext cx="4583579" cy="4583579"/>
-          </a:xfrm>
-          <a:prstGeom prst="pie">
-            <a:avLst>
-              <a:gd name="adj1" fmla="val 14117487"/>
-              <a:gd name="adj2" fmla="val 18224864"/>
-            </a:avLst>
-          </a:prstGeom>
-        </p:spPr>
-        <p:style>
-          <a:lnRef idx="2">
-            <a:schemeClr val="accent1">
-              <a:shade val="50000"/>
-            </a:schemeClr>
-          </a:lnRef>
-          <a:fillRef idx="1">
-            <a:schemeClr val="accent1"/>
-          </a:fillRef>
-          <a:effectRef idx="0">
-            <a:schemeClr val="accent1"/>
-          </a:effectRef>
-          <a:fontRef idx="minor">
-            <a:schemeClr val="lt1"/>
-          </a:fontRef>
-        </p:style>
-        <p:txBody>
-          <a:bodyPr rtlCol="0" anchor="ctr"/>
-          <a:lstStyle/>
-          <a:p>
-            <a:pPr algn="ctr"/>
-            <a:endParaRPr lang="en-US">
-              <a:solidFill>
-                <a:schemeClr val="tx1"/>
-              </a:solidFill>
-            </a:endParaRPr>
-          </a:p>
-        </p:txBody>
-      </p:sp>
-      <p:sp>
-        <p:nvSpPr>
-          <p:cNvPr id="10" name="Circular Arrow 9"/>
-          <p:cNvSpPr/>
-          <p:nvPr/>
-        </p:nvSpPr>
-        <p:spPr>
-          <a:xfrm rot="3945274">
-            <a:off x="3003772" y="1845505"/>
-            <a:ext cx="3343757" cy="3389667"/>
-          </a:xfrm>
-          <a:prstGeom prst="circularArrow">
-            <a:avLst>
-              <a:gd name="adj1" fmla="val 12500"/>
-              <a:gd name="adj2" fmla="val 1142319"/>
-              <a:gd name="adj3" fmla="val 20457681"/>
-              <a:gd name="adj4" fmla="val 2562463"/>
-              <a:gd name="adj5" fmla="val 12500"/>
-            </a:avLst>
-          </a:prstGeom>
-        </p:spPr>
-        <p:style>
-          <a:lnRef idx="2">
-            <a:schemeClr val="accent1">
-              <a:shade val="50000"/>
-            </a:schemeClr>
-          </a:lnRef>
-          <a:fillRef idx="1">
-            <a:schemeClr val="accent1"/>
-          </a:fillRef>
-          <a:effectRef idx="0">
-            <a:schemeClr val="accent1"/>
-          </a:effectRef>
-          <a:fontRef idx="minor">
-            <a:schemeClr val="lt1"/>
-          </a:fontRef>
-        </p:style>
-        <p:txBody>
-          <a:bodyPr rtlCol="0" anchor="ctr"/>
-          <a:lstStyle/>
-          <a:p>
-            <a:pPr algn="ctr"/>
-            <a:endParaRPr lang="en-US">
-              <a:solidFill>
-                <a:schemeClr val="tx1"/>
-              </a:solidFill>
-            </a:endParaRPr>
-          </a:p>
-        </p:txBody>
-      </p:sp>
-      <p:sp>
-        <p:nvSpPr>
-          <p:cNvPr id="11" name="Oval 10"/>
-          <p:cNvSpPr/>
-          <p:nvPr/>
-        </p:nvSpPr>
-        <p:spPr>
-          <a:xfrm>
-            <a:off x="3810000" y="2614508"/>
-            <a:ext cx="1814286" cy="1814286"/>
-          </a:xfrm>
-          <a:prstGeom prst="ellipse">
-            <a:avLst/>
-          </a:prstGeom>
-        </p:spPr>
-        <p:style>
-          <a:lnRef idx="2">
-            <a:schemeClr val="accent1">
-              <a:shade val="50000"/>
-            </a:schemeClr>
-          </a:lnRef>
-          <a:fillRef idx="1">
-            <a:schemeClr val="accent1"/>
-          </a:fillRef>
-          <a:effectRef idx="0">
-            <a:schemeClr val="accent1"/>
-          </a:effectRef>
-          <a:fontRef idx="minor">
-            <a:schemeClr val="lt1"/>
-          </a:fontRef>
-        </p:style>
-        <p:txBody>
-          <a:bodyPr rtlCol="0" anchor="ctr"/>
-          <a:lstStyle/>
-          <a:p>
-            <a:pPr algn="ctr"/>
-            <a:endParaRPr lang="en-US"/>
-          </a:p>
-        </p:txBody>
-      </p:sp>
-      <p:pic>
-        <p:nvPicPr>
-          <p:cNvPr id="13" name="Picture 4"/>
-          <p:cNvPicPr>
-            <a:picLocks noChangeAspect="1" noChangeArrowheads="1"/>
-          </p:cNvPicPr>
-          <p:nvPr/>
-        </p:nvPicPr>
-        <p:blipFill rotWithShape="1">
-          <a:blip r:embed="rId2">
-            <a:extLst>
-              <a:ext uri="{28A0092B-C50C-407E-A947-70E740481C1C}">
-                <a14:useLocalDpi xmlns:a14="http://schemas.microsoft.com/office/drawing/2010/main" val="0"/>
-              </a:ext>
-            </a:extLst>
-          </a:blip>
-          <a:srcRect l="19185"/>
-          <a:stretch/>
-        </p:blipFill>
-        <p:spPr bwMode="auto">
-          <a:xfrm rot="18411361">
-            <a:off x="4898053" y="4601961"/>
-            <a:ext cx="1022446" cy="1265171"/>
-          </a:xfrm>
-          <a:prstGeom prst="rect">
-            <a:avLst/>
-          </a:prstGeom>
-          <a:ln>
-            <a:noFill/>
-          </a:ln>
-          <a:effectLst>
-            <a:outerShdw blurRad="190500" algn="tl" rotWithShape="0">
-              <a:srgbClr val="000000">
-                <a:alpha val="70000"/>
-              </a:srgbClr>
-            </a:outerShdw>
-          </a:effectLst>
-          <a:extLst>
-            <a:ext uri="{909E8E84-426E-40DD-AFC4-6F175D3DCCD1}">
-              <a14:hiddenFill xmlns:a14="http://schemas.microsoft.com/office/drawing/2010/main">
-                <a:solidFill>
-                  <a:schemeClr val="accent1"/>
-                </a:solidFill>
-              </a14:hiddenFill>
-            </a:ext>
-            <a:ext uri="{91240B29-F687-4F45-9708-019B960494DF}">
-              <a14:hiddenLine xmlns:a14="http://schemas.microsoft.com/office/drawing/2010/main" w="9525">
-                <a:solidFill>
-                  <a:schemeClr val="tx1"/>
-                </a:solidFill>
-                <a:miter lim="800000"/>
-                <a:headEnd/>
-                <a:tailEnd/>
-              </a14:hiddenLine>
-            </a:ext>
-          </a:extLst>
-        </p:spPr>
-      </p:pic>
-      <p:sp>
-        <p:nvSpPr>
-          <p:cNvPr id="2" name="Chevron 1"/>
-          <p:cNvSpPr/>
-          <p:nvPr/>
-        </p:nvSpPr>
-        <p:spPr>
-          <a:xfrm rot="1390753">
-            <a:off x="4859638" y="2022963"/>
-            <a:ext cx="838200" cy="609600"/>
-          </a:xfrm>
-          <a:prstGeom prst="chevron">
-            <a:avLst/>
-          </a:prstGeom>
-          <a:solidFill>
-            <a:schemeClr val="bg1"/>
-          </a:solidFill>
-        </p:spPr>
-        <p:style>
-          <a:lnRef idx="2">
-            <a:schemeClr val="accent1">
-              <a:shade val="50000"/>
-            </a:schemeClr>
-          </a:lnRef>
-          <a:fillRef idx="1">
-            <a:schemeClr val="accent1"/>
-          </a:fillRef>
-          <a:effectRef idx="0">
-            <a:schemeClr val="accent1"/>
-          </a:effectRef>
-          <a:fontRef idx="minor">
-            <a:schemeClr val="lt1"/>
-          </a:fontRef>
-        </p:style>
-        <p:txBody>
-          <a:bodyPr rtlCol="0" anchor="ctr"/>
-          <a:lstStyle/>
-          <a:p>
-            <a:pPr algn="ctr"/>
-            <a:endParaRPr lang="en-US">
-              <a:solidFill>
-                <a:schemeClr val="tx1"/>
-              </a:solidFill>
-            </a:endParaRPr>
-          </a:p>
-        </p:txBody>
-      </p:sp>
-      <p:sp>
-        <p:nvSpPr>
-          <p:cNvPr id="15" name="Chevron 14"/>
-          <p:cNvSpPr/>
-          <p:nvPr/>
-        </p:nvSpPr>
-        <p:spPr>
-          <a:xfrm rot="13951024">
-            <a:off x="2584842" y="4411135"/>
-            <a:ext cx="2345819" cy="1475546"/>
-          </a:xfrm>
-          <a:prstGeom prst="chevron">
-            <a:avLst/>
-          </a:prstGeom>
-          <a:solidFill>
-            <a:schemeClr val="tx1"/>
-          </a:solidFill>
-        </p:spPr>
-        <p:style>
-          <a:lnRef idx="2">
-            <a:schemeClr val="accent1">
-              <a:shade val="50000"/>
-            </a:schemeClr>
-          </a:lnRef>
-          <a:fillRef idx="1">
-            <a:schemeClr val="accent1"/>
-          </a:fillRef>
-          <a:effectRef idx="0">
-            <a:schemeClr val="accent1"/>
-          </a:effectRef>
-          <a:fontRef idx="minor">
-            <a:schemeClr val="lt1"/>
-          </a:fontRef>
-        </p:style>
-        <p:txBody>
-          <a:bodyPr rtlCol="0" anchor="ctr"/>
-          <a:lstStyle/>
-          <a:p>
-            <a:pPr algn="ctr"/>
-            <a:endParaRPr lang="en-US">
-              <a:solidFill>
-                <a:schemeClr val="tx1"/>
-              </a:solidFill>
-            </a:endParaRPr>
-          </a:p>
-        </p:txBody>
-      </p:sp>
-      <p:sp>
-        <p:nvSpPr>
-          <p:cNvPr id="16" name="Chevron 15"/>
-          <p:cNvSpPr/>
-          <p:nvPr/>
-        </p:nvSpPr>
-        <p:spPr>
-          <a:xfrm rot="15106046">
-            <a:off x="3031179" y="3585390"/>
-            <a:ext cx="838200" cy="609600"/>
-          </a:xfrm>
-          <a:prstGeom prst="chevron">
-            <a:avLst/>
-          </a:prstGeom>
-          <a:solidFill>
-            <a:srgbClr val="7030A0"/>
-          </a:solidFill>
-        </p:spPr>
-        <p:style>
-          <a:lnRef idx="2">
-            <a:schemeClr val="accent1">
-              <a:shade val="50000"/>
-            </a:schemeClr>
-          </a:lnRef>
-          <a:fillRef idx="1">
-            <a:schemeClr val="accent1"/>
-          </a:fillRef>
-          <a:effectRef idx="0">
-            <a:schemeClr val="accent1"/>
-          </a:effectRef>
-          <a:fontRef idx="minor">
-            <a:schemeClr val="lt1"/>
-          </a:fontRef>
-        </p:style>
-        <p:txBody>
-          <a:bodyPr rtlCol="0" anchor="ctr"/>
-          <a:lstStyle/>
-          <a:p>
-            <a:pPr algn="ctr"/>
-            <a:endParaRPr lang="en-US">
-              <a:solidFill>
-                <a:schemeClr val="tx1"/>
-              </a:solidFill>
-            </a:endParaRPr>
-          </a:p>
-        </p:txBody>
-      </p:sp>
-      <p:sp>
-        <p:nvSpPr>
-          <p:cNvPr id="17" name="Chevron 16"/>
-          <p:cNvSpPr/>
-          <p:nvPr/>
-        </p:nvSpPr>
-        <p:spPr>
-          <a:xfrm rot="8045617">
-            <a:off x="5601353" y="3830494"/>
-            <a:ext cx="1245684" cy="1864204"/>
-          </a:xfrm>
-          <a:prstGeom prst="chevron">
-            <a:avLst/>
-          </a:prstGeom>
-          <a:solidFill>
-            <a:srgbClr val="00B0F0"/>
-          </a:solidFill>
-        </p:spPr>
-        <p:style>
-          <a:lnRef idx="2">
-            <a:schemeClr val="accent1">
-              <a:shade val="50000"/>
-            </a:schemeClr>
-          </a:lnRef>
-          <a:fillRef idx="1">
-            <a:schemeClr val="accent1"/>
-          </a:fillRef>
-          <a:effectRef idx="0">
-            <a:schemeClr val="accent1"/>
-          </a:effectRef>
-          <a:fontRef idx="minor">
-            <a:schemeClr val="lt1"/>
-          </a:fontRef>
-        </p:style>
-        <p:txBody>
-          <a:bodyPr rtlCol="0" anchor="ctr"/>
-          <a:lstStyle/>
-          <a:p>
-            <a:pPr algn="ctr"/>
-            <a:endParaRPr lang="en-US">
-              <a:solidFill>
-                <a:schemeClr val="tx1"/>
-              </a:solidFill>
-            </a:endParaRPr>
-          </a:p>
-        </p:txBody>
-      </p:sp>
-      <p:sp>
-        <p:nvSpPr>
-          <p:cNvPr id="18" name="Chevron 17"/>
-          <p:cNvSpPr/>
-          <p:nvPr/>
-        </p:nvSpPr>
-        <p:spPr>
-          <a:xfrm rot="5573224">
-            <a:off x="5612599" y="3329540"/>
-            <a:ext cx="838200" cy="609600"/>
-          </a:xfrm>
-          <a:prstGeom prst="chevron">
-            <a:avLst/>
-          </a:prstGeom>
-          <a:solidFill>
-            <a:srgbClr val="92D050"/>
-          </a:solidFill>
-        </p:spPr>
-        <p:style>
-          <a:lnRef idx="2">
-            <a:schemeClr val="accent1">
-              <a:shade val="50000"/>
-            </a:schemeClr>
-          </a:lnRef>
-          <a:fillRef idx="1">
-            <a:schemeClr val="accent1"/>
-          </a:fillRef>
-          <a:effectRef idx="0">
-            <a:schemeClr val="accent1"/>
-          </a:effectRef>
-          <a:fontRef idx="minor">
-            <a:schemeClr val="lt1"/>
-          </a:fontRef>
-        </p:style>
-        <p:txBody>
-          <a:bodyPr rtlCol="0" anchor="ctr"/>
-          <a:lstStyle/>
-          <a:p>
-            <a:pPr algn="ctr"/>
-            <a:endParaRPr lang="en-US">
-              <a:solidFill>
-                <a:schemeClr val="tx1"/>
-              </a:solidFill>
-            </a:endParaRPr>
-          </a:p>
-        </p:txBody>
-      </p:sp>
-      <p:sp>
-        <p:nvSpPr>
-          <p:cNvPr id="19" name="Chevron 18"/>
-          <p:cNvSpPr/>
-          <p:nvPr/>
-        </p:nvSpPr>
-        <p:spPr>
-          <a:xfrm rot="4144531">
-            <a:off x="5546200" y="2789229"/>
-            <a:ext cx="838200" cy="609600"/>
-          </a:xfrm>
-          <a:prstGeom prst="chevron">
-            <a:avLst/>
-          </a:prstGeom>
-          <a:solidFill>
-            <a:srgbClr val="FFFF00"/>
-          </a:solidFill>
-        </p:spPr>
-        <p:style>
-          <a:lnRef idx="2">
-            <a:schemeClr val="accent1">
-              <a:shade val="50000"/>
-            </a:schemeClr>
-          </a:lnRef>
-          <a:fillRef idx="1">
-            <a:schemeClr val="accent1"/>
-          </a:fillRef>
-          <a:effectRef idx="0">
-            <a:schemeClr val="accent1"/>
-          </a:effectRef>
-          <a:fontRef idx="minor">
-            <a:schemeClr val="lt1"/>
-          </a:fontRef>
-        </p:style>
-        <p:txBody>
-          <a:bodyPr rtlCol="0" anchor="ctr"/>
-          <a:lstStyle/>
-          <a:p>
-            <a:pPr algn="ctr"/>
-            <a:endParaRPr lang="en-US">
-              <a:solidFill>
-                <a:schemeClr val="tx1"/>
-              </a:solidFill>
-            </a:endParaRPr>
-          </a:p>
-        </p:txBody>
-      </p:sp>
-      <p:sp>
-        <p:nvSpPr>
-          <p:cNvPr id="20" name="Chevron 19"/>
-          <p:cNvSpPr/>
-          <p:nvPr/>
-        </p:nvSpPr>
-        <p:spPr>
-          <a:xfrm rot="2479297">
-            <a:off x="5579236" y="2789634"/>
-            <a:ext cx="284912" cy="225395"/>
-          </a:xfrm>
-          <a:prstGeom prst="chevron">
-            <a:avLst/>
-          </a:prstGeom>
-          <a:solidFill>
-            <a:srgbClr val="FFC000"/>
-          </a:solidFill>
-        </p:spPr>
-        <p:style>
-          <a:lnRef idx="2">
-            <a:schemeClr val="accent1">
-              <a:shade val="50000"/>
-            </a:schemeClr>
-          </a:lnRef>
-          <a:fillRef idx="1">
-            <a:schemeClr val="accent1"/>
-          </a:fillRef>
-          <a:effectRef idx="0">
-            <a:schemeClr val="accent1"/>
-          </a:effectRef>
-          <a:fontRef idx="minor">
-            <a:schemeClr val="lt1"/>
-          </a:fontRef>
-        </p:style>
-        <p:txBody>
-          <a:bodyPr rtlCol="0" anchor="ctr"/>
-          <a:lstStyle/>
-          <a:p>
-            <a:pPr algn="ctr"/>
-            <a:endParaRPr lang="en-US">
-              <a:solidFill>
-                <a:schemeClr val="tx1"/>
-              </a:solidFill>
-            </a:endParaRPr>
-          </a:p>
-        </p:txBody>
-      </p:sp>
-      <p:sp>
-        <p:nvSpPr>
-          <p:cNvPr id="21" name="Chevron 20"/>
-          <p:cNvSpPr/>
-          <p:nvPr/>
-        </p:nvSpPr>
-        <p:spPr>
-          <a:xfrm rot="2819439">
-            <a:off x="5293840" y="2351312"/>
-            <a:ext cx="838200" cy="609600"/>
-          </a:xfrm>
-          <a:prstGeom prst="chevron">
-            <a:avLst/>
-          </a:prstGeom>
-          <a:solidFill>
-            <a:srgbClr val="C00000"/>
-          </a:solidFill>
-        </p:spPr>
-        <p:style>
-          <a:lnRef idx="2">
-            <a:schemeClr val="accent1">
-              <a:shade val="50000"/>
-            </a:schemeClr>
-          </a:lnRef>
-          <a:fillRef idx="1">
-            <a:schemeClr val="accent1"/>
-          </a:fillRef>
-          <a:effectRef idx="0">
-            <a:schemeClr val="accent1"/>
-          </a:effectRef>
-          <a:fontRef idx="minor">
-            <a:schemeClr val="lt1"/>
-          </a:fontRef>
-        </p:style>
-        <p:txBody>
-          <a:bodyPr rtlCol="0" anchor="ctr"/>
-          <a:lstStyle/>
-          <a:p>
-            <a:pPr algn="ctr"/>
-            <a:endParaRPr lang="en-US">
-              <a:solidFill>
-                <a:schemeClr val="tx1"/>
-              </a:solidFill>
-            </a:endParaRPr>
-          </a:p>
-        </p:txBody>
-      </p:sp>
-    </p:spTree>
-    <p:extLst>
-      <p:ext uri="{BB962C8B-B14F-4D97-AF65-F5344CB8AC3E}">
-        <p14:creationId xmlns:p14="http://schemas.microsoft.com/office/powerpoint/2010/main" val="2154058062"/>
-      </p:ext>
-    </p:extLst>
-  </p:cSld>
-  <p:clrMapOvr>
-    <a:masterClrMapping/>
-  </p:clrMapOvr>
-</p:sld>
-</file>
-
-<file path=ppt/slides/slide12.xml><?xml version="1.0" encoding="utf-8"?>
-<p:sld xmlns:a="http://schemas.openxmlformats.org/drawingml/2006/main" xmlns:r="http://schemas.openxmlformats.org/officeDocument/2006/relationships" xmlns:p="http://schemas.openxmlformats.org/presentationml/2006/main">
-  <p:cSld>
-    <p:spTree>
-      <p:nvGrpSpPr>
-        <p:cNvPr id="1" name=""/>
-        <p:cNvGrpSpPr/>
-        <p:nvPr/>
-      </p:nvGrpSpPr>
-      <p:grpSpPr>
-        <a:xfrm>
-          <a:off x="0" y="0"/>
-          <a:ext cx="0" cy="0"/>
-          <a:chOff x="0" y="0"/>
-          <a:chExt cx="0" cy="0"/>
-        </a:xfrm>
-      </p:grpSpPr>
-      <p:sp>
-        <p:nvSpPr>
-          <p:cNvPr id="3" name="Pie 2"/>
-          <p:cNvSpPr/>
-          <p:nvPr/>
-        </p:nvSpPr>
-        <p:spPr>
-          <a:xfrm rot="20747556">
-            <a:off x="2439622" y="1097421"/>
-            <a:ext cx="4583579" cy="4583579"/>
-          </a:xfrm>
-          <a:prstGeom prst="pie">
-            <a:avLst>
-              <a:gd name="adj1" fmla="val 14117487"/>
-              <a:gd name="adj2" fmla="val 18224864"/>
-            </a:avLst>
-          </a:prstGeom>
-        </p:spPr>
-        <p:style>
-          <a:lnRef idx="2">
-            <a:schemeClr val="accent1">
-              <a:shade val="50000"/>
-            </a:schemeClr>
-          </a:lnRef>
-          <a:fillRef idx="1">
-            <a:schemeClr val="accent1"/>
-          </a:fillRef>
-          <a:effectRef idx="0">
-            <a:schemeClr val="accent1"/>
-          </a:effectRef>
-          <a:fontRef idx="minor">
-            <a:schemeClr val="lt1"/>
-          </a:fontRef>
-        </p:style>
-        <p:txBody>
-          <a:bodyPr rtlCol="0" anchor="ctr"/>
-          <a:lstStyle/>
-          <a:p>
-            <a:pPr algn="ctr"/>
-            <a:endParaRPr lang="en-US">
-              <a:solidFill>
-                <a:schemeClr val="tx1"/>
-              </a:solidFill>
-            </a:endParaRPr>
-          </a:p>
-        </p:txBody>
-      </p:sp>
-      <p:sp>
-        <p:nvSpPr>
-          <p:cNvPr id="10" name="Circular Arrow 9"/>
-          <p:cNvSpPr/>
-          <p:nvPr/>
-        </p:nvSpPr>
-        <p:spPr>
-          <a:xfrm rot="3945274">
-            <a:off x="3003772" y="1845505"/>
-            <a:ext cx="3343757" cy="3389667"/>
-          </a:xfrm>
-          <a:prstGeom prst="circularArrow">
-            <a:avLst>
-              <a:gd name="adj1" fmla="val 12500"/>
-              <a:gd name="adj2" fmla="val 1142319"/>
-              <a:gd name="adj3" fmla="val 20457681"/>
-              <a:gd name="adj4" fmla="val 2562463"/>
-              <a:gd name="adj5" fmla="val 12500"/>
-            </a:avLst>
-          </a:prstGeom>
-        </p:spPr>
-        <p:style>
-          <a:lnRef idx="2">
-            <a:schemeClr val="accent1">
-              <a:shade val="50000"/>
-            </a:schemeClr>
-          </a:lnRef>
-          <a:fillRef idx="1">
-            <a:schemeClr val="accent1"/>
-          </a:fillRef>
-          <a:effectRef idx="0">
-            <a:schemeClr val="accent1"/>
-          </a:effectRef>
-          <a:fontRef idx="minor">
-            <a:schemeClr val="lt1"/>
-          </a:fontRef>
-        </p:style>
-        <p:txBody>
-          <a:bodyPr rtlCol="0" anchor="ctr"/>
-          <a:lstStyle/>
-          <a:p>
-            <a:pPr algn="ctr"/>
-            <a:endParaRPr lang="en-US">
-              <a:solidFill>
-                <a:schemeClr val="tx1"/>
-              </a:solidFill>
-            </a:endParaRPr>
-          </a:p>
-        </p:txBody>
-      </p:sp>
-      <p:sp>
-        <p:nvSpPr>
-          <p:cNvPr id="11" name="Oval 10"/>
-          <p:cNvSpPr/>
-          <p:nvPr/>
-        </p:nvSpPr>
-        <p:spPr>
-          <a:xfrm>
-            <a:off x="3810000" y="2614508"/>
-            <a:ext cx="1814286" cy="1814286"/>
-          </a:xfrm>
-          <a:prstGeom prst="ellipse">
-            <a:avLst/>
-          </a:prstGeom>
-        </p:spPr>
-        <p:style>
-          <a:lnRef idx="2">
-            <a:schemeClr val="accent1">
-              <a:shade val="50000"/>
-            </a:schemeClr>
-          </a:lnRef>
-          <a:fillRef idx="1">
-            <a:schemeClr val="accent1"/>
-          </a:fillRef>
-          <a:effectRef idx="0">
-            <a:schemeClr val="accent1"/>
-          </a:effectRef>
-          <a:fontRef idx="minor">
-            <a:schemeClr val="lt1"/>
-          </a:fontRef>
-        </p:style>
-        <p:txBody>
-          <a:bodyPr rtlCol="0" anchor="ctr"/>
-          <a:lstStyle/>
-          <a:p>
-            <a:pPr algn="ctr"/>
-            <a:endParaRPr lang="en-US"/>
-          </a:p>
-        </p:txBody>
-      </p:sp>
-      <p:pic>
-        <p:nvPicPr>
-          <p:cNvPr id="13" name="Picture 4"/>
-          <p:cNvPicPr>
-            <a:picLocks noChangeAspect="1" noChangeArrowheads="1"/>
-          </p:cNvPicPr>
-          <p:nvPr/>
-        </p:nvPicPr>
-        <p:blipFill rotWithShape="1">
-          <a:blip r:embed="rId2">
-            <a:extLst>
-              <a:ext uri="{28A0092B-C50C-407E-A947-70E740481C1C}">
-                <a14:useLocalDpi xmlns:a14="http://schemas.microsoft.com/office/drawing/2010/main" val="0"/>
-              </a:ext>
-            </a:extLst>
-          </a:blip>
-          <a:srcRect l="19185"/>
-          <a:stretch/>
-        </p:blipFill>
-        <p:spPr bwMode="auto">
-          <a:xfrm rot="20384714">
-            <a:off x="3856989" y="4703261"/>
-            <a:ext cx="1022446" cy="1265171"/>
-          </a:xfrm>
-          <a:prstGeom prst="rect">
-            <a:avLst/>
-          </a:prstGeom>
-          <a:ln>
-            <a:noFill/>
-          </a:ln>
-          <a:effectLst>
-            <a:outerShdw blurRad="190500" algn="tl" rotWithShape="0">
-              <a:srgbClr val="000000">
-                <a:alpha val="70000"/>
-              </a:srgbClr>
-            </a:outerShdw>
-          </a:effectLst>
-          <a:extLst>
-            <a:ext uri="{909E8E84-426E-40DD-AFC4-6F175D3DCCD1}">
-              <a14:hiddenFill xmlns:a14="http://schemas.microsoft.com/office/drawing/2010/main">
-                <a:solidFill>
-                  <a:schemeClr val="accent1"/>
-                </a:solidFill>
-              </a14:hiddenFill>
-            </a:ext>
-            <a:ext uri="{91240B29-F687-4F45-9708-019B960494DF}">
-              <a14:hiddenLine xmlns:a14="http://schemas.microsoft.com/office/drawing/2010/main" w="9525">
-                <a:solidFill>
-                  <a:schemeClr val="tx1"/>
-                </a:solidFill>
-                <a:miter lim="800000"/>
-                <a:headEnd/>
-                <a:tailEnd/>
-              </a14:hiddenLine>
-            </a:ext>
-          </a:extLst>
-        </p:spPr>
-      </p:pic>
-      <p:sp>
-        <p:nvSpPr>
-          <p:cNvPr id="2" name="Chevron 1"/>
-          <p:cNvSpPr/>
-          <p:nvPr/>
-        </p:nvSpPr>
-        <p:spPr>
-          <a:xfrm rot="485047">
-            <a:off x="4529345" y="1917906"/>
-            <a:ext cx="838200" cy="609600"/>
-          </a:xfrm>
-          <a:prstGeom prst="chevron">
-            <a:avLst/>
-          </a:prstGeom>
-          <a:solidFill>
-            <a:schemeClr val="bg1"/>
-          </a:solidFill>
-        </p:spPr>
-        <p:style>
-          <a:lnRef idx="2">
-            <a:schemeClr val="accent1">
-              <a:shade val="50000"/>
-            </a:schemeClr>
-          </a:lnRef>
-          <a:fillRef idx="1">
-            <a:schemeClr val="accent1"/>
-          </a:fillRef>
-          <a:effectRef idx="0">
-            <a:schemeClr val="accent1"/>
-          </a:effectRef>
-          <a:fontRef idx="minor">
-            <a:schemeClr val="lt1"/>
-          </a:fontRef>
-        </p:style>
-        <p:txBody>
-          <a:bodyPr rtlCol="0" anchor="ctr"/>
-          <a:lstStyle/>
-          <a:p>
-            <a:pPr algn="ctr"/>
-            <a:endParaRPr lang="en-US">
-              <a:solidFill>
-                <a:schemeClr val="tx1"/>
-              </a:solidFill>
-            </a:endParaRPr>
-          </a:p>
-        </p:txBody>
-      </p:sp>
-      <p:sp>
-        <p:nvSpPr>
-          <p:cNvPr id="15" name="Chevron 14"/>
-          <p:cNvSpPr/>
-          <p:nvPr/>
-        </p:nvSpPr>
-        <p:spPr>
-          <a:xfrm rot="14580790">
-            <a:off x="2304460" y="4209136"/>
-            <a:ext cx="2345819" cy="1475546"/>
-          </a:xfrm>
-          <a:prstGeom prst="chevron">
-            <a:avLst/>
-          </a:prstGeom>
-          <a:solidFill>
-            <a:schemeClr val="tx1"/>
-          </a:solidFill>
-        </p:spPr>
-        <p:style>
-          <a:lnRef idx="2">
-            <a:schemeClr val="accent1">
-              <a:shade val="50000"/>
-            </a:schemeClr>
-          </a:lnRef>
-          <a:fillRef idx="1">
-            <a:schemeClr val="accent1"/>
-          </a:fillRef>
-          <a:effectRef idx="0">
-            <a:schemeClr val="accent1"/>
-          </a:effectRef>
-          <a:fontRef idx="minor">
-            <a:schemeClr val="lt1"/>
-          </a:fontRef>
-        </p:style>
-        <p:txBody>
-          <a:bodyPr rtlCol="0" anchor="ctr"/>
-          <a:lstStyle/>
-          <a:p>
-            <a:pPr algn="ctr"/>
-            <a:endParaRPr lang="en-US">
-              <a:solidFill>
-                <a:schemeClr val="tx1"/>
-              </a:solidFill>
-            </a:endParaRPr>
-          </a:p>
-        </p:txBody>
-      </p:sp>
-      <p:sp>
-        <p:nvSpPr>
-          <p:cNvPr id="16" name="Chevron 15"/>
-          <p:cNvSpPr/>
-          <p:nvPr/>
-        </p:nvSpPr>
-        <p:spPr>
-          <a:xfrm rot="15106046">
-            <a:off x="3031179" y="3585390"/>
-            <a:ext cx="838200" cy="609600"/>
-          </a:xfrm>
-          <a:prstGeom prst="chevron">
-            <a:avLst/>
-          </a:prstGeom>
-          <a:solidFill>
-            <a:srgbClr val="7030A0"/>
-          </a:solidFill>
-        </p:spPr>
-        <p:style>
-          <a:lnRef idx="2">
-            <a:schemeClr val="accent1">
-              <a:shade val="50000"/>
-            </a:schemeClr>
-          </a:lnRef>
-          <a:fillRef idx="1">
-            <a:schemeClr val="accent1"/>
-          </a:fillRef>
-          <a:effectRef idx="0">
-            <a:schemeClr val="accent1"/>
-          </a:effectRef>
-          <a:fontRef idx="minor">
-            <a:schemeClr val="lt1"/>
-          </a:fontRef>
-        </p:style>
-        <p:txBody>
-          <a:bodyPr rtlCol="0" anchor="ctr"/>
-          <a:lstStyle/>
-          <a:p>
-            <a:pPr algn="ctr"/>
-            <a:endParaRPr lang="en-US">
-              <a:solidFill>
-                <a:schemeClr val="tx1"/>
-              </a:solidFill>
-            </a:endParaRPr>
-          </a:p>
-        </p:txBody>
-      </p:sp>
-      <p:sp>
-        <p:nvSpPr>
-          <p:cNvPr id="17" name="Chevron 16"/>
-          <p:cNvSpPr/>
-          <p:nvPr/>
-        </p:nvSpPr>
-        <p:spPr>
-          <a:xfrm rot="9922799">
-            <a:off x="4737759" y="4432675"/>
-            <a:ext cx="1245684" cy="1864204"/>
-          </a:xfrm>
-          <a:prstGeom prst="chevron">
-            <a:avLst/>
-          </a:prstGeom>
-          <a:solidFill>
-            <a:srgbClr val="00B0F0"/>
-          </a:solidFill>
-        </p:spPr>
-        <p:style>
-          <a:lnRef idx="2">
-            <a:schemeClr val="accent1">
-              <a:shade val="50000"/>
-            </a:schemeClr>
-          </a:lnRef>
-          <a:fillRef idx="1">
-            <a:schemeClr val="accent1"/>
-          </a:fillRef>
-          <a:effectRef idx="0">
-            <a:schemeClr val="accent1"/>
-          </a:effectRef>
-          <a:fontRef idx="minor">
-            <a:schemeClr val="lt1"/>
-          </a:fontRef>
-        </p:style>
-        <p:txBody>
-          <a:bodyPr rtlCol="0" anchor="ctr"/>
-          <a:lstStyle/>
-          <a:p>
-            <a:pPr algn="ctr"/>
-            <a:endParaRPr lang="en-US">
-              <a:solidFill>
-                <a:schemeClr val="tx1"/>
-              </a:solidFill>
-            </a:endParaRPr>
-          </a:p>
-        </p:txBody>
-      </p:sp>
-      <p:sp>
-        <p:nvSpPr>
-          <p:cNvPr id="18" name="Chevron 17"/>
-          <p:cNvSpPr/>
-          <p:nvPr/>
-        </p:nvSpPr>
-        <p:spPr>
-          <a:xfrm rot="7716660">
-            <a:off x="5299454" y="4075880"/>
-            <a:ext cx="838200" cy="609600"/>
-          </a:xfrm>
-          <a:prstGeom prst="chevron">
-            <a:avLst/>
-          </a:prstGeom>
-          <a:solidFill>
-            <a:srgbClr val="92D050"/>
-          </a:solidFill>
-        </p:spPr>
-        <p:style>
-          <a:lnRef idx="2">
-            <a:schemeClr val="accent1">
-              <a:shade val="50000"/>
-            </a:schemeClr>
-          </a:lnRef>
-          <a:fillRef idx="1">
-            <a:schemeClr val="accent1"/>
-          </a:fillRef>
-          <a:effectRef idx="0">
-            <a:schemeClr val="accent1"/>
-          </a:effectRef>
-          <a:fontRef idx="minor">
-            <a:schemeClr val="lt1"/>
-          </a:fontRef>
-        </p:style>
-        <p:txBody>
-          <a:bodyPr rtlCol="0" anchor="ctr"/>
-          <a:lstStyle/>
-          <a:p>
-            <a:pPr algn="ctr"/>
-            <a:endParaRPr lang="en-US">
-              <a:solidFill>
-                <a:schemeClr val="tx1"/>
-              </a:solidFill>
-            </a:endParaRPr>
-          </a:p>
-        </p:txBody>
-      </p:sp>
-      <p:sp>
-        <p:nvSpPr>
-          <p:cNvPr id="19" name="Chevron 18"/>
-          <p:cNvSpPr/>
-          <p:nvPr/>
-        </p:nvSpPr>
-        <p:spPr>
-          <a:xfrm rot="5908741">
-            <a:off x="5595361" y="3457104"/>
-            <a:ext cx="838200" cy="609600"/>
-          </a:xfrm>
-          <a:prstGeom prst="chevron">
-            <a:avLst/>
-          </a:prstGeom>
-          <a:solidFill>
-            <a:srgbClr val="FFFF00"/>
-          </a:solidFill>
-        </p:spPr>
-        <p:style>
-          <a:lnRef idx="2">
-            <a:schemeClr val="accent1">
-              <a:shade val="50000"/>
-            </a:schemeClr>
-          </a:lnRef>
-          <a:fillRef idx="1">
-            <a:schemeClr val="accent1"/>
-          </a:fillRef>
-          <a:effectRef idx="0">
-            <a:schemeClr val="accent1"/>
-          </a:effectRef>
-          <a:fontRef idx="minor">
-            <a:schemeClr val="lt1"/>
-          </a:fontRef>
-        </p:style>
-        <p:txBody>
-          <a:bodyPr rtlCol="0" anchor="ctr"/>
-          <a:lstStyle/>
-          <a:p>
-            <a:pPr algn="ctr"/>
-            <a:endParaRPr lang="en-US">
-              <a:solidFill>
-                <a:schemeClr val="tx1"/>
-              </a:solidFill>
-            </a:endParaRPr>
-          </a:p>
-        </p:txBody>
-      </p:sp>
-      <p:sp>
-        <p:nvSpPr>
-          <p:cNvPr id="20" name="Chevron 19"/>
-          <p:cNvSpPr/>
-          <p:nvPr/>
-        </p:nvSpPr>
-        <p:spPr>
-          <a:xfrm rot="3200175">
-            <a:off x="5686149" y="3012309"/>
-            <a:ext cx="284912" cy="225395"/>
-          </a:xfrm>
-          <a:prstGeom prst="chevron">
-            <a:avLst/>
-          </a:prstGeom>
-          <a:solidFill>
-            <a:srgbClr val="FFC000"/>
-          </a:solidFill>
-        </p:spPr>
-        <p:style>
-          <a:lnRef idx="2">
-            <a:schemeClr val="accent1">
-              <a:shade val="50000"/>
-            </a:schemeClr>
-          </a:lnRef>
-          <a:fillRef idx="1">
-            <a:schemeClr val="accent1"/>
-          </a:fillRef>
-          <a:effectRef idx="0">
-            <a:schemeClr val="accent1"/>
-          </a:effectRef>
-          <a:fontRef idx="minor">
-            <a:schemeClr val="lt1"/>
-          </a:fontRef>
-        </p:style>
-        <p:txBody>
-          <a:bodyPr rtlCol="0" anchor="ctr"/>
-          <a:lstStyle/>
-          <a:p>
-            <a:pPr algn="ctr"/>
-            <a:endParaRPr lang="en-US">
-              <a:solidFill>
-                <a:schemeClr val="tx1"/>
-              </a:solidFill>
-            </a:endParaRPr>
-          </a:p>
-        </p:txBody>
-      </p:sp>
-      <p:sp>
-        <p:nvSpPr>
-          <p:cNvPr id="21" name="Chevron 20"/>
-          <p:cNvSpPr/>
-          <p:nvPr/>
-        </p:nvSpPr>
-        <p:spPr>
-          <a:xfrm rot="2292963">
-            <a:off x="5150149" y="2209536"/>
-            <a:ext cx="838200" cy="609600"/>
-          </a:xfrm>
-          <a:prstGeom prst="chevron">
-            <a:avLst/>
-          </a:prstGeom>
-          <a:solidFill>
-            <a:srgbClr val="C00000"/>
-          </a:solidFill>
-        </p:spPr>
-        <p:style>
-          <a:lnRef idx="2">
-            <a:schemeClr val="accent1">
-              <a:shade val="50000"/>
-            </a:schemeClr>
-          </a:lnRef>
-          <a:fillRef idx="1">
-            <a:schemeClr val="accent1"/>
-          </a:fillRef>
-          <a:effectRef idx="0">
-            <a:schemeClr val="accent1"/>
-          </a:effectRef>
-          <a:fontRef idx="minor">
-            <a:schemeClr val="lt1"/>
-          </a:fontRef>
-        </p:style>
-        <p:txBody>
-          <a:bodyPr rtlCol="0" anchor="ctr"/>
-          <a:lstStyle/>
-          <a:p>
-            <a:pPr algn="ctr"/>
-            <a:endParaRPr lang="en-US">
-              <a:solidFill>
-                <a:schemeClr val="tx1"/>
-              </a:solidFill>
-            </a:endParaRPr>
-          </a:p>
-        </p:txBody>
-      </p:sp>
-    </p:spTree>
-    <p:extLst>
-      <p:ext uri="{BB962C8B-B14F-4D97-AF65-F5344CB8AC3E}">
-        <p14:creationId xmlns:p14="http://schemas.microsoft.com/office/powerpoint/2010/main" val="2341596113"/>
-      </p:ext>
-    </p:extLst>
-  </p:cSld>
-  <p:clrMapOvr>
-    <a:masterClrMapping/>
-  </p:clrMapOvr>
-</p:sld>
-</file>
-
-<file path=ppt/slides/slide13.xml><?xml version="1.0" encoding="utf-8"?>
 <p:sld xmlns:a="http://schemas.openxmlformats.org/drawingml/2006/main" xmlns:r="http://schemas.openxmlformats.org/officeDocument/2006/relationships" xmlns:p="http://schemas.openxmlformats.org/presentationml/2006/main" show="0">
   <p:cSld name="PPAck201403240026082737">
     <p:spTree>
@@ -12750,15 +11462,11 @@
             </a:r>
             <a:r>
               <a:rPr lang="en-US" dirty="0" smtClean="0"/>
-              <a:t>Angle / </a:t>
-            </a:r>
-            <a:r>
-              <a:rPr lang="en-US" dirty="0" smtClean="0"/>
-              <a:t>Within </a:t>
-            </a:r>
-            <a:r>
-              <a:rPr lang="en-US" dirty="0" smtClean="0"/>
-              <a:t>Second</a:t>
+              <a:t>Angle / Second </a:t>
+            </a:r>
+            <a:r>
+              <a:rPr lang="en-US" smtClean="0"/>
+              <a:t>and Third</a:t>
             </a:r>
             <a:endParaRPr lang="en-SG" dirty="0"/>
           </a:p>
@@ -12786,7 +11494,7 @@
     </p:spTree>
     <p:extLst>
       <p:ext uri="{BB962C8B-B14F-4D97-AF65-F5344CB8AC3E}">
-        <p14:creationId xmlns:p14="http://schemas.microsoft.com/office/powerpoint/2010/main" val="2218057322"/>
+        <p14:creationId xmlns:p14="http://schemas.microsoft.com/office/powerpoint/2010/main" val="2602621610"/>
       </p:ext>
     </p:extLst>
   </p:cSld>
@@ -12970,8 +11678,8 @@
           <a:stretch/>
         </p:blipFill>
         <p:spPr bwMode="auto">
-          <a:xfrm rot="17141387">
-            <a:off x="5469843" y="4236492"/>
+          <a:xfrm rot="18411361">
+            <a:off x="4898053" y="4601961"/>
             <a:ext cx="1022446" cy="1265171"/>
           </a:xfrm>
           <a:prstGeom prst="rect">
@@ -13015,8 +11723,8 @@
           <p:nvPr/>
         </p:nvSpPr>
         <p:spPr>
-          <a:xfrm rot="18786147">
-            <a:off x="3366978" y="2282038"/>
+          <a:xfrm rot="1390753">
+            <a:off x="4859638" y="2022963"/>
             <a:ext cx="838200" cy="609600"/>
           </a:xfrm>
           <a:prstGeom prst="chevron">
@@ -13062,8 +11770,8 @@
           <p:nvPr/>
         </p:nvSpPr>
         <p:spPr>
-          <a:xfrm rot="17142028">
-            <a:off x="1666599" y="2990972"/>
+          <a:xfrm rot="13951024">
+            <a:off x="2584842" y="4411135"/>
             <a:ext cx="2345819" cy="1475546"/>
           </a:xfrm>
           <a:prstGeom prst="chevron">
@@ -13109,8 +11817,8 @@
           <p:nvPr/>
         </p:nvSpPr>
         <p:spPr>
-          <a:xfrm rot="12735390">
-            <a:off x="3555128" y="4307191"/>
+          <a:xfrm rot="15106046">
+            <a:off x="3031179" y="3585390"/>
             <a:ext cx="838200" cy="609600"/>
           </a:xfrm>
           <a:prstGeom prst="chevron">
@@ -13156,8 +11864,8 @@
           <p:nvPr/>
         </p:nvSpPr>
         <p:spPr>
-          <a:xfrm rot="6286538">
-            <a:off x="6015960" y="2933611"/>
+          <a:xfrm rot="8045617">
+            <a:off x="5601353" y="3830494"/>
             <a:ext cx="1245684" cy="1864204"/>
           </a:xfrm>
           <a:prstGeom prst="chevron">
@@ -13203,8 +11911,8 @@
           <p:nvPr/>
         </p:nvSpPr>
         <p:spPr>
-          <a:xfrm rot="3325040">
-            <a:off x="5409926" y="2506589"/>
+          <a:xfrm rot="5573224">
+            <a:off x="5612599" y="3329540"/>
             <a:ext cx="838200" cy="609600"/>
           </a:xfrm>
           <a:prstGeom prst="chevron">
@@ -13250,8 +11958,8 @@
           <p:nvPr/>
         </p:nvSpPr>
         <p:spPr>
-          <a:xfrm rot="1407241">
-            <a:off x="4865361" y="2025672"/>
+          <a:xfrm rot="4144531">
+            <a:off x="5546200" y="2789229"/>
             <a:ext cx="838200" cy="609600"/>
           </a:xfrm>
           <a:prstGeom prst="chevron">
@@ -13297,8 +12005,8 @@
           <p:nvPr/>
         </p:nvSpPr>
         <p:spPr>
-          <a:xfrm rot="20852902">
-            <a:off x="4668762" y="2232593"/>
+          <a:xfrm rot="2479297">
+            <a:off x="5579236" y="2789634"/>
             <a:ext cx="284912" cy="225395"/>
           </a:xfrm>
           <a:prstGeom prst="chevron">
@@ -13344,8 +12052,8 @@
           <p:nvPr/>
         </p:nvSpPr>
         <p:spPr>
-          <a:xfrm rot="20703939">
-            <a:off x="4002999" y="1930882"/>
+          <a:xfrm rot="2819439">
+            <a:off x="5293840" y="2351312"/>
             <a:ext cx="838200" cy="609600"/>
           </a:xfrm>
           <a:prstGeom prst="chevron">
@@ -13387,7 +12095,7 @@
     </p:spTree>
     <p:extLst>
       <p:ext uri="{BB962C8B-B14F-4D97-AF65-F5344CB8AC3E}">
-        <p14:creationId xmlns:p14="http://schemas.microsoft.com/office/powerpoint/2010/main" val="1875361145"/>
+        <p14:creationId xmlns:p14="http://schemas.microsoft.com/office/powerpoint/2010/main" val="2154058062"/>
       </p:ext>
     </p:extLst>
   </p:cSld>
@@ -13571,8 +12279,8 @@
           <a:stretch/>
         </p:blipFill>
         <p:spPr bwMode="auto">
-          <a:xfrm rot="1224224">
-            <a:off x="2759181" y="4037980"/>
+          <a:xfrm rot="20384714">
+            <a:off x="3856989" y="4703261"/>
             <a:ext cx="1022446" cy="1265171"/>
           </a:xfrm>
           <a:prstGeom prst="rect">
@@ -13616,8 +12324,8 @@
           <p:nvPr/>
         </p:nvSpPr>
         <p:spPr>
-          <a:xfrm rot="19497719">
-            <a:off x="3578968" y="2110646"/>
+          <a:xfrm rot="485047">
+            <a:off x="4529345" y="1917906"/>
             <a:ext cx="838200" cy="609600"/>
           </a:xfrm>
           <a:prstGeom prst="chevron">
@@ -13663,8 +12371,8 @@
           <p:nvPr/>
         </p:nvSpPr>
         <p:spPr>
-          <a:xfrm rot="19029562">
-            <a:off x="1834504" y="1980620"/>
+          <a:xfrm rot="14580790">
+            <a:off x="2304460" y="4209136"/>
             <a:ext cx="2345819" cy="1475546"/>
           </a:xfrm>
           <a:prstGeom prst="chevron">
@@ -13710,8 +12418,8 @@
           <p:nvPr/>
         </p:nvSpPr>
         <p:spPr>
-          <a:xfrm rot="15680561">
-            <a:off x="2987525" y="3369522"/>
+          <a:xfrm rot="15106046">
+            <a:off x="3031179" y="3585390"/>
             <a:ext cx="838200" cy="609600"/>
           </a:xfrm>
           <a:prstGeom prst="chevron">
@@ -13757,8 +12465,8 @@
           <p:nvPr/>
         </p:nvSpPr>
         <p:spPr>
-          <a:xfrm rot="7838876">
-            <a:off x="5673212" y="3737673"/>
+          <a:xfrm rot="9922799">
+            <a:off x="4737759" y="4432675"/>
             <a:ext cx="1245684" cy="1864204"/>
           </a:xfrm>
           <a:prstGeom prst="chevron">
@@ -13804,8 +12512,8 @@
           <p:nvPr/>
         </p:nvSpPr>
         <p:spPr>
-          <a:xfrm rot="5532055">
-            <a:off x="5613854" y="3313790"/>
+          <a:xfrm rot="7716660">
+            <a:off x="5299454" y="4075880"/>
             <a:ext cx="838200" cy="609600"/>
           </a:xfrm>
           <a:prstGeom prst="chevron">
@@ -13851,8 +12559,8 @@
           <p:nvPr/>
         </p:nvSpPr>
         <p:spPr>
-          <a:xfrm rot="3623456">
-            <a:off x="5467320" y="2605666"/>
+          <a:xfrm rot="5908741">
+            <a:off x="5595361" y="3457104"/>
             <a:ext cx="838200" cy="609600"/>
           </a:xfrm>
           <a:prstGeom prst="chevron">
@@ -13898,8 +12606,8 @@
           <p:nvPr/>
         </p:nvSpPr>
         <p:spPr>
-          <a:xfrm rot="814208">
-            <a:off x="5175310" y="2393116"/>
+          <a:xfrm rot="3200175">
+            <a:off x="5686149" y="3012309"/>
             <a:ext cx="284912" cy="225395"/>
           </a:xfrm>
           <a:prstGeom prst="chevron">
@@ -13945,8 +12653,8 @@
           <p:nvPr/>
         </p:nvSpPr>
         <p:spPr>
-          <a:xfrm rot="21406315">
-            <a:off x="4270052" y="1897766"/>
+          <a:xfrm rot="2292963">
+            <a:off x="5150149" y="2209536"/>
             <a:ext cx="838200" cy="609600"/>
           </a:xfrm>
           <a:prstGeom prst="chevron">
@@ -13988,7 +12696,7 @@
     </p:spTree>
     <p:extLst>
       <p:ext uri="{BB962C8B-B14F-4D97-AF65-F5344CB8AC3E}">
-        <p14:creationId xmlns:p14="http://schemas.microsoft.com/office/powerpoint/2010/main" val="1387545893"/>
+        <p14:creationId xmlns:p14="http://schemas.microsoft.com/office/powerpoint/2010/main" val="2341596113"/>
       </p:ext>
     </p:extLst>
   </p:cSld>

</xml_diff>

<commit_message>
Refactor and update UT
</commit_message>
<xml_diff>
--- a/doc/test/PositionsLab/PositionsLabDistributeAngle.pptx
+++ b/doc/test/PositionsLab/PositionsLabDistributeAngle.pptx
@@ -9,13 +9,13 @@
   <p:sldIdLst>
     <p:sldId id="287" r:id="rId4"/>
     <p:sldId id="256" r:id="rId5"/>
-    <p:sldId id="295" r:id="rId6"/>
+    <p:sldId id="306" r:id="rId6"/>
     <p:sldId id="292" r:id="rId7"/>
-    <p:sldId id="305" r:id="rId8"/>
-    <p:sldId id="300" r:id="rId9"/>
+    <p:sldId id="307" r:id="rId8"/>
+    <p:sldId id="308" r:id="rId9"/>
     <p:sldId id="298" r:id="rId10"/>
-    <p:sldId id="303" r:id="rId11"/>
-    <p:sldId id="304" r:id="rId12"/>
+    <p:sldId id="309" r:id="rId11"/>
+    <p:sldId id="310" r:id="rId12"/>
     <p:sldId id="274" r:id="rId13"/>
   </p:sldIdLst>
   <p:sldSz cx="9144000" cy="6858000" type="screen4x3"/>
@@ -126,13 +126,13 @@
         <p14:section name="Align by Slide" id="{A3A2B0AB-762C-4281-AA7B-EF7E134E0DC4}">
           <p14:sldIdLst>
             <p14:sldId id="256"/>
-            <p14:sldId id="295"/>
+            <p14:sldId id="306"/>
             <p14:sldId id="292"/>
-            <p14:sldId id="305"/>
-            <p14:sldId id="300"/>
+            <p14:sldId id="307"/>
+            <p14:sldId id="308"/>
             <p14:sldId id="298"/>
-            <p14:sldId id="303"/>
-            <p14:sldId id="304"/>
+            <p14:sldId id="309"/>
+            <p14:sldId id="310"/>
             <p14:sldId id="274"/>
           </p14:sldIdLst>
         </p14:section>
@@ -324,7 +324,7 @@
           <a:p>
             <a:fld id="{699DC775-C286-4358-8C92-D7E584E969B3}" type="datetimeFigureOut">
               <a:rPr lang="en-US" smtClean="0"/>
-              <a:t>6/16/2016</a:t>
+              <a:t>2016/07/01</a:t>
             </a:fld>
             <a:endParaRPr lang="en-US"/>
           </a:p>
@@ -492,7 +492,7 @@
           <a:p>
             <a:fld id="{699DC775-C286-4358-8C92-D7E584E969B3}" type="datetimeFigureOut">
               <a:rPr lang="en-US" smtClean="0"/>
-              <a:t>6/16/2016</a:t>
+              <a:t>2016/07/01</a:t>
             </a:fld>
             <a:endParaRPr lang="en-US"/>
           </a:p>
@@ -670,7 +670,7 @@
           <a:p>
             <a:fld id="{699DC775-C286-4358-8C92-D7E584E969B3}" type="datetimeFigureOut">
               <a:rPr lang="en-US" smtClean="0"/>
-              <a:t>6/16/2016</a:t>
+              <a:t>2016/07/01</a:t>
             </a:fld>
             <a:endParaRPr lang="en-US"/>
           </a:p>
@@ -910,7 +910,7 @@
           <a:p>
             <a:fld id="{699DC775-C286-4358-8C92-D7E584E969B3}" type="datetimeFigureOut">
               <a:rPr lang="en-US" smtClean="0"/>
-              <a:t>6/16/2016</a:t>
+              <a:t>2016/07/01</a:t>
             </a:fld>
             <a:endParaRPr lang="en-US"/>
           </a:p>
@@ -1078,7 +1078,7 @@
           <a:p>
             <a:fld id="{699DC775-C286-4358-8C92-D7E584E969B3}" type="datetimeFigureOut">
               <a:rPr lang="en-US" smtClean="0"/>
-              <a:t>6/16/2016</a:t>
+              <a:t>2016/07/01</a:t>
             </a:fld>
             <a:endParaRPr lang="en-US"/>
           </a:p>
@@ -1323,7 +1323,7 @@
           <a:p>
             <a:fld id="{699DC775-C286-4358-8C92-D7E584E969B3}" type="datetimeFigureOut">
               <a:rPr lang="en-US" smtClean="0"/>
-              <a:t>6/16/2016</a:t>
+              <a:t>2016/07/01</a:t>
             </a:fld>
             <a:endParaRPr lang="en-US"/>
           </a:p>
@@ -1608,7 +1608,7 @@
           <a:p>
             <a:fld id="{699DC775-C286-4358-8C92-D7E584E969B3}" type="datetimeFigureOut">
               <a:rPr lang="en-US" smtClean="0"/>
-              <a:t>6/16/2016</a:t>
+              <a:t>2016/07/01</a:t>
             </a:fld>
             <a:endParaRPr lang="en-US"/>
           </a:p>
@@ -2027,7 +2027,7 @@
           <a:p>
             <a:fld id="{699DC775-C286-4358-8C92-D7E584E969B3}" type="datetimeFigureOut">
               <a:rPr lang="en-US" smtClean="0"/>
-              <a:t>6/16/2016</a:t>
+              <a:t>2016/07/01</a:t>
             </a:fld>
             <a:endParaRPr lang="en-US"/>
           </a:p>
@@ -2144,7 +2144,7 @@
           <a:p>
             <a:fld id="{699DC775-C286-4358-8C92-D7E584E969B3}" type="datetimeFigureOut">
               <a:rPr lang="en-US" smtClean="0"/>
-              <a:t>6/16/2016</a:t>
+              <a:t>2016/07/01</a:t>
             </a:fld>
             <a:endParaRPr lang="en-US"/>
           </a:p>
@@ -2239,7 +2239,7 @@
           <a:p>
             <a:fld id="{699DC775-C286-4358-8C92-D7E584E969B3}" type="datetimeFigureOut">
               <a:rPr lang="en-US" smtClean="0"/>
-              <a:t>6/16/2016</a:t>
+              <a:t>2016/07/01</a:t>
             </a:fld>
             <a:endParaRPr lang="en-US"/>
           </a:p>
@@ -2514,7 +2514,7 @@
           <a:p>
             <a:fld id="{699DC775-C286-4358-8C92-D7E584E969B3}" type="datetimeFigureOut">
               <a:rPr lang="en-US" smtClean="0"/>
-              <a:t>6/16/2016</a:t>
+              <a:t>2016/07/01</a:t>
             </a:fld>
             <a:endParaRPr lang="en-US"/>
           </a:p>
@@ -2682,7 +2682,7 @@
           <a:p>
             <a:fld id="{699DC775-C286-4358-8C92-D7E584E969B3}" type="datetimeFigureOut">
               <a:rPr lang="en-US" smtClean="0"/>
-              <a:t>6/16/2016</a:t>
+              <a:t>2016/07/01</a:t>
             </a:fld>
             <a:endParaRPr lang="en-US"/>
           </a:p>
@@ -2934,7 +2934,7 @@
           <a:p>
             <a:fld id="{699DC775-C286-4358-8C92-D7E584E969B3}" type="datetimeFigureOut">
               <a:rPr lang="en-US" smtClean="0"/>
-              <a:t>6/16/2016</a:t>
+              <a:t>2016/07/01</a:t>
             </a:fld>
             <a:endParaRPr lang="en-US"/>
           </a:p>
@@ -3102,7 +3102,7 @@
           <a:p>
             <a:fld id="{699DC775-C286-4358-8C92-D7E584E969B3}" type="datetimeFigureOut">
               <a:rPr lang="en-US" smtClean="0"/>
-              <a:t>6/16/2016</a:t>
+              <a:t>2016/07/01</a:t>
             </a:fld>
             <a:endParaRPr lang="en-US"/>
           </a:p>
@@ -3280,7 +3280,7 @@
           <a:p>
             <a:fld id="{699DC775-C286-4358-8C92-D7E584E969B3}" type="datetimeFigureOut">
               <a:rPr lang="en-US" smtClean="0"/>
-              <a:t>6/16/2016</a:t>
+              <a:t>2016/07/01</a:t>
             </a:fld>
             <a:endParaRPr lang="en-US"/>
           </a:p>
@@ -3528,7 +3528,7 @@
           <a:p>
             <a:fld id="{699DC775-C286-4358-8C92-D7E584E969B3}" type="datetimeFigureOut">
               <a:rPr lang="en-US" smtClean="0"/>
-              <a:t>6/16/2016</a:t>
+              <a:t>2016/07/01</a:t>
             </a:fld>
             <a:endParaRPr lang="en-US"/>
           </a:p>
@@ -3704,7 +3704,7 @@
           <a:p>
             <a:fld id="{699DC775-C286-4358-8C92-D7E584E969B3}" type="datetimeFigureOut">
               <a:rPr lang="en-US" smtClean="0"/>
-              <a:t>6/16/2016</a:t>
+              <a:t>2016/07/01</a:t>
             </a:fld>
             <a:endParaRPr lang="en-US"/>
           </a:p>
@@ -3957,7 +3957,7 @@
           <a:p>
             <a:fld id="{699DC775-C286-4358-8C92-D7E584E969B3}" type="datetimeFigureOut">
               <a:rPr lang="en-US" smtClean="0"/>
-              <a:t>6/16/2016</a:t>
+              <a:t>2016/07/01</a:t>
             </a:fld>
             <a:endParaRPr lang="en-US"/>
           </a:p>
@@ -4250,7 +4250,7 @@
           <a:p>
             <a:fld id="{699DC775-C286-4358-8C92-D7E584E969B3}" type="datetimeFigureOut">
               <a:rPr lang="en-US" smtClean="0"/>
-              <a:t>6/16/2016</a:t>
+              <a:t>2016/07/01</a:t>
             </a:fld>
             <a:endParaRPr lang="en-US"/>
           </a:p>
@@ -4677,7 +4677,7 @@
           <a:p>
             <a:fld id="{699DC775-C286-4358-8C92-D7E584E969B3}" type="datetimeFigureOut">
               <a:rPr lang="en-US" smtClean="0"/>
-              <a:t>6/16/2016</a:t>
+              <a:t>2016/07/01</a:t>
             </a:fld>
             <a:endParaRPr lang="en-US"/>
           </a:p>
@@ -4802,7 +4802,7 @@
           <a:p>
             <a:fld id="{699DC775-C286-4358-8C92-D7E584E969B3}" type="datetimeFigureOut">
               <a:rPr lang="en-US" smtClean="0"/>
-              <a:t>6/16/2016</a:t>
+              <a:t>2016/07/01</a:t>
             </a:fld>
             <a:endParaRPr lang="en-US"/>
           </a:p>
@@ -4905,7 +4905,7 @@
           <a:p>
             <a:fld id="{699DC775-C286-4358-8C92-D7E584E969B3}" type="datetimeFigureOut">
               <a:rPr lang="en-US" smtClean="0"/>
-              <a:t>6/16/2016</a:t>
+              <a:t>2016/07/01</a:t>
             </a:fld>
             <a:endParaRPr lang="en-US"/>
           </a:p>
@@ -5150,7 +5150,7 @@
           <a:p>
             <a:fld id="{699DC775-C286-4358-8C92-D7E584E969B3}" type="datetimeFigureOut">
               <a:rPr lang="en-US" smtClean="0"/>
-              <a:t>6/16/2016</a:t>
+              <a:t>2016/07/01</a:t>
             </a:fld>
             <a:endParaRPr lang="en-US"/>
           </a:p>
@@ -5433,7 +5433,7 @@
           <a:p>
             <a:fld id="{699DC775-C286-4358-8C92-D7E584E969B3}" type="datetimeFigureOut">
               <a:rPr lang="en-US" smtClean="0"/>
-              <a:t>6/16/2016</a:t>
+              <a:t>2016/07/01</a:t>
             </a:fld>
             <a:endParaRPr lang="en-US"/>
           </a:p>
@@ -5693,7 +5693,7 @@
           <a:p>
             <a:fld id="{699DC775-C286-4358-8C92-D7E584E969B3}" type="datetimeFigureOut">
               <a:rPr lang="en-US" smtClean="0"/>
-              <a:t>6/16/2016</a:t>
+              <a:t>2016/07/01</a:t>
             </a:fld>
             <a:endParaRPr lang="en-US"/>
           </a:p>
@@ -5869,7 +5869,7 @@
           <a:p>
             <a:fld id="{699DC775-C286-4358-8C92-D7E584E969B3}" type="datetimeFigureOut">
               <a:rPr lang="en-US" smtClean="0"/>
-              <a:t>6/16/2016</a:t>
+              <a:t>2016/07/01</a:t>
             </a:fld>
             <a:endParaRPr lang="en-US"/>
           </a:p>
@@ -6055,7 +6055,7 @@
           <a:p>
             <a:fld id="{699DC775-C286-4358-8C92-D7E584E969B3}" type="datetimeFigureOut">
               <a:rPr lang="en-US" smtClean="0"/>
-              <a:t>6/16/2016</a:t>
+              <a:t>2016/07/01</a:t>
             </a:fld>
             <a:endParaRPr lang="en-US"/>
           </a:p>
@@ -6340,7 +6340,7 @@
           <a:p>
             <a:fld id="{699DC775-C286-4358-8C92-D7E584E969B3}" type="datetimeFigureOut">
               <a:rPr lang="en-US" smtClean="0"/>
-              <a:t>6/16/2016</a:t>
+              <a:t>2016/07/01</a:t>
             </a:fld>
             <a:endParaRPr lang="en-US"/>
           </a:p>
@@ -6759,7 +6759,7 @@
           <a:p>
             <a:fld id="{699DC775-C286-4358-8C92-D7E584E969B3}" type="datetimeFigureOut">
               <a:rPr lang="en-US" smtClean="0"/>
-              <a:t>6/16/2016</a:t>
+              <a:t>2016/07/01</a:t>
             </a:fld>
             <a:endParaRPr lang="en-US"/>
           </a:p>
@@ -6876,7 +6876,7 @@
           <a:p>
             <a:fld id="{699DC775-C286-4358-8C92-D7E584E969B3}" type="datetimeFigureOut">
               <a:rPr lang="en-US" smtClean="0"/>
-              <a:t>6/16/2016</a:t>
+              <a:t>2016/07/01</a:t>
             </a:fld>
             <a:endParaRPr lang="en-US"/>
           </a:p>
@@ -6971,7 +6971,7 @@
           <a:p>
             <a:fld id="{699DC775-C286-4358-8C92-D7E584E969B3}" type="datetimeFigureOut">
               <a:rPr lang="en-US" smtClean="0"/>
-              <a:t>6/16/2016</a:t>
+              <a:t>2016/07/01</a:t>
             </a:fld>
             <a:endParaRPr lang="en-US"/>
           </a:p>
@@ -7246,7 +7246,7 @@
           <a:p>
             <a:fld id="{699DC775-C286-4358-8C92-D7E584E969B3}" type="datetimeFigureOut">
               <a:rPr lang="en-US" smtClean="0"/>
-              <a:t>6/16/2016</a:t>
+              <a:t>2016/07/01</a:t>
             </a:fld>
             <a:endParaRPr lang="en-US"/>
           </a:p>
@@ -7498,7 +7498,7 @@
           <a:p>
             <a:fld id="{699DC775-C286-4358-8C92-D7E584E969B3}" type="datetimeFigureOut">
               <a:rPr lang="en-US" smtClean="0"/>
-              <a:t>6/16/2016</a:t>
+              <a:t>2016/07/01</a:t>
             </a:fld>
             <a:endParaRPr lang="en-US"/>
           </a:p>
@@ -7709,7 +7709,7 @@
           <a:p>
             <a:fld id="{699DC775-C286-4358-8C92-D7E584E969B3}" type="datetimeFigureOut">
               <a:rPr lang="en-US" smtClean="0"/>
-              <a:t>6/16/2016</a:t>
+              <a:t>2016/07/01</a:t>
             </a:fld>
             <a:endParaRPr lang="en-US"/>
           </a:p>
@@ -8222,7 +8222,7 @@
           <a:p>
             <a:fld id="{699DC775-C286-4358-8C92-D7E584E969B3}" type="datetimeFigureOut">
               <a:rPr lang="en-US" smtClean="0"/>
-              <a:t>6/16/2016</a:t>
+              <a:t>2016/07/01</a:t>
             </a:fld>
             <a:endParaRPr lang="en-US"/>
           </a:p>
@@ -8733,7 +8733,7 @@
           <a:p>
             <a:fld id="{699DC775-C286-4358-8C92-D7E584E969B3}" type="datetimeFigureOut">
               <a:rPr lang="en-US" smtClean="0"/>
-              <a:t>6/16/2016</a:t>
+              <a:t>2016/07/01</a:t>
             </a:fld>
             <a:endParaRPr lang="en-US"/>
           </a:p>
@@ -9611,56 +9611,6 @@
       </p:sp>
       <p:sp>
         <p:nvSpPr>
-          <p:cNvPr id="10" name="Circular Arrow 9"/>
-          <p:cNvSpPr/>
-          <p:nvPr/>
-        </p:nvSpPr>
-        <p:spPr>
-          <a:xfrm rot="3945274">
-            <a:off x="3003772" y="1845505"/>
-            <a:ext cx="3343757" cy="3389667"/>
-          </a:xfrm>
-          <a:prstGeom prst="circularArrow">
-            <a:avLst>
-              <a:gd name="adj1" fmla="val 12500"/>
-              <a:gd name="adj2" fmla="val 1142319"/>
-              <a:gd name="adj3" fmla="val 20457681"/>
-              <a:gd name="adj4" fmla="val 2562463"/>
-              <a:gd name="adj5" fmla="val 12500"/>
-            </a:avLst>
-          </a:prstGeom>
-        </p:spPr>
-        <p:style>
-          <a:lnRef idx="2">
-            <a:schemeClr val="accent1">
-              <a:shade val="50000"/>
-            </a:schemeClr>
-          </a:lnRef>
-          <a:fillRef idx="1">
-            <a:schemeClr val="accent1"/>
-          </a:fillRef>
-          <a:effectRef idx="0">
-            <a:schemeClr val="accent1"/>
-          </a:effectRef>
-          <a:fontRef idx="minor">
-            <a:schemeClr val="lt1"/>
-          </a:fontRef>
-        </p:style>
-        <p:txBody>
-          <a:bodyPr rtlCol="0" anchor="ctr"/>
-          <a:lstStyle/>
-          <a:p>
-            <a:pPr algn="ctr"/>
-            <a:endParaRPr lang="en-US">
-              <a:solidFill>
-                <a:schemeClr val="tx1"/>
-              </a:solidFill>
-            </a:endParaRPr>
-          </a:p>
-        </p:txBody>
-      </p:sp>
-      <p:sp>
-        <p:nvSpPr>
           <p:cNvPr id="11" name="Oval 10"/>
           <p:cNvSpPr/>
           <p:nvPr/>
@@ -9719,7 +9669,7 @@
           <a:stretch/>
         </p:blipFill>
         <p:spPr bwMode="auto">
-          <a:xfrm rot="729116">
+          <a:xfrm rot="19941172">
             <a:off x="2939056" y="4233727"/>
             <a:ext cx="1022446" cy="1265171"/>
           </a:xfrm>
@@ -9811,7 +9761,7 @@
           <p:nvPr/>
         </p:nvSpPr>
         <p:spPr>
-          <a:xfrm rot="18279591">
+          <a:xfrm rot="16200000">
             <a:off x="1701178" y="2369698"/>
             <a:ext cx="2345819" cy="1475546"/>
           </a:xfrm>
@@ -9858,7 +9808,7 @@
           <p:nvPr/>
         </p:nvSpPr>
         <p:spPr>
-          <a:xfrm rot="15106046">
+          <a:xfrm rot="16200000">
             <a:off x="3031179" y="3585390"/>
             <a:ext cx="838200" cy="609600"/>
           </a:xfrm>
@@ -9905,7 +9855,7 @@
           <p:nvPr/>
         </p:nvSpPr>
         <p:spPr>
-          <a:xfrm rot="12243987">
+          <a:xfrm rot="10800000">
             <a:off x="3444509" y="4430451"/>
             <a:ext cx="1245684" cy="1864204"/>
           </a:xfrm>
@@ -9952,7 +9902,7 @@
           <p:nvPr/>
         </p:nvSpPr>
         <p:spPr>
-          <a:xfrm rot="10199150">
+          <a:xfrm rot="10800000">
             <a:off x="4481701" y="4523383"/>
             <a:ext cx="838200" cy="609600"/>
           </a:xfrm>
@@ -9999,7 +9949,7 @@
           <p:nvPr/>
         </p:nvSpPr>
         <p:spPr>
-          <a:xfrm rot="7892566">
+          <a:xfrm rot="5400000">
             <a:off x="5254203" y="4125979"/>
             <a:ext cx="838200" cy="609600"/>
           </a:xfrm>
@@ -10046,7 +9996,7 @@
           <p:nvPr/>
         </p:nvSpPr>
         <p:spPr>
-          <a:xfrm rot="5696764">
+          <a:xfrm rot="5400000">
             <a:off x="5669103" y="3850460"/>
             <a:ext cx="284912" cy="225395"/>
           </a:xfrm>
@@ -10093,7 +10043,7 @@
           <p:nvPr/>
         </p:nvSpPr>
         <p:spPr>
-          <a:xfrm rot="4015421">
+          <a:xfrm>
             <a:off x="5529264" y="2742654"/>
             <a:ext cx="838200" cy="609600"/>
           </a:xfrm>
@@ -10136,7 +10086,7 @@
     </p:spTree>
     <p:extLst>
       <p:ext uri="{BB962C8B-B14F-4D97-AF65-F5344CB8AC3E}">
-        <p14:creationId xmlns:p14="http://schemas.microsoft.com/office/powerpoint/2010/main" val="2544136449"/>
+        <p14:creationId xmlns:p14="http://schemas.microsoft.com/office/powerpoint/2010/main" val="1193087885"/>
       </p:ext>
     </p:extLst>
   </p:cSld>
@@ -10288,56 +10238,6 @@
       </p:sp>
       <p:sp>
         <p:nvSpPr>
-          <p:cNvPr id="10" name="Circular Arrow 9"/>
-          <p:cNvSpPr/>
-          <p:nvPr/>
-        </p:nvSpPr>
-        <p:spPr>
-          <a:xfrm rot="3945274">
-            <a:off x="3003772" y="1845505"/>
-            <a:ext cx="3343757" cy="3389667"/>
-          </a:xfrm>
-          <a:prstGeom prst="circularArrow">
-            <a:avLst>
-              <a:gd name="adj1" fmla="val 12500"/>
-              <a:gd name="adj2" fmla="val 1142319"/>
-              <a:gd name="adj3" fmla="val 20457681"/>
-              <a:gd name="adj4" fmla="val 2562463"/>
-              <a:gd name="adj5" fmla="val 12500"/>
-            </a:avLst>
-          </a:prstGeom>
-        </p:spPr>
-        <p:style>
-          <a:lnRef idx="2">
-            <a:schemeClr val="accent1">
-              <a:shade val="50000"/>
-            </a:schemeClr>
-          </a:lnRef>
-          <a:fillRef idx="1">
-            <a:schemeClr val="accent1"/>
-          </a:fillRef>
-          <a:effectRef idx="0">
-            <a:schemeClr val="accent1"/>
-          </a:effectRef>
-          <a:fontRef idx="minor">
-            <a:schemeClr val="lt1"/>
-          </a:fontRef>
-        </p:style>
-        <p:txBody>
-          <a:bodyPr rtlCol="0" anchor="ctr"/>
-          <a:lstStyle/>
-          <a:p>
-            <a:pPr algn="ctr"/>
-            <a:endParaRPr lang="en-US">
-              <a:solidFill>
-                <a:schemeClr val="tx1"/>
-              </a:solidFill>
-            </a:endParaRPr>
-          </a:p>
-        </p:txBody>
-      </p:sp>
-      <p:sp>
-        <p:nvSpPr>
           <p:cNvPr id="11" name="Oval 10"/>
           <p:cNvSpPr/>
           <p:nvPr/>
@@ -10396,8 +10296,8 @@
           <a:stretch/>
         </p:blipFill>
         <p:spPr bwMode="auto">
-          <a:xfrm rot="19082725">
-            <a:off x="4552504" y="4703711"/>
+          <a:xfrm rot="19941172">
+            <a:off x="3789304" y="4688923"/>
             <a:ext cx="1022446" cy="1265171"/>
           </a:xfrm>
           <a:prstGeom prst="rect">
@@ -10441,8 +10341,8 @@
           <p:nvPr/>
         </p:nvSpPr>
         <p:spPr>
-          <a:xfrm rot="18256095">
-            <a:off x="3234459" y="2436116"/>
+          <a:xfrm>
+            <a:off x="4954370" y="2072303"/>
             <a:ext cx="838200" cy="609600"/>
           </a:xfrm>
           <a:prstGeom prst="chevron">
@@ -10488,8 +10388,8 @@
           <p:nvPr/>
         </p:nvSpPr>
         <p:spPr>
-          <a:xfrm rot="16751078">
-            <a:off x="1702228" y="3202705"/>
+          <a:xfrm rot="16200000">
+            <a:off x="1853066" y="1942241"/>
             <a:ext cx="2345819" cy="1475546"/>
           </a:xfrm>
           <a:prstGeom prst="chevron">
@@ -10535,8 +10435,8 @@
           <p:nvPr/>
         </p:nvSpPr>
         <p:spPr>
-          <a:xfrm rot="12483538">
-            <a:off x="3636928" y="4358645"/>
+          <a:xfrm rot="16200000">
+            <a:off x="3132024" y="3834234"/>
             <a:ext cx="838200" cy="609600"/>
           </a:xfrm>
           <a:prstGeom prst="chevron">
@@ -10582,8 +10482,8 @@
           <p:nvPr/>
         </p:nvSpPr>
         <p:spPr>
-          <a:xfrm rot="8366975">
-            <a:off x="5478940" y="3965749"/>
+          <a:xfrm rot="10800000">
+            <a:off x="4983216" y="4327645"/>
             <a:ext cx="1245684" cy="1864204"/>
           </a:xfrm>
           <a:prstGeom prst="chevron">
@@ -10629,8 +10529,8 @@
           <p:nvPr/>
         </p:nvSpPr>
         <p:spPr>
-          <a:xfrm rot="5544576">
-            <a:off x="5613492" y="3318581"/>
+          <a:xfrm rot="10800000">
+            <a:off x="5503889" y="3752287"/>
             <a:ext cx="838200" cy="609600"/>
           </a:xfrm>
           <a:prstGeom prst="chevron">
@@ -10676,8 +10576,8 @@
           <p:nvPr/>
         </p:nvSpPr>
         <p:spPr>
-          <a:xfrm rot="3765875">
-            <a:off x="5491630" y="2654618"/>
+          <a:xfrm rot="5400000">
+            <a:off x="5617420" y="3216185"/>
             <a:ext cx="838200" cy="609600"/>
           </a:xfrm>
           <a:prstGeom prst="chevron">
@@ -10723,8 +10623,8 @@
           <p:nvPr/>
         </p:nvSpPr>
         <p:spPr>
-          <a:xfrm rot="1750636">
-            <a:off x="5426465" y="2592162"/>
+          <a:xfrm rot="5400000">
+            <a:off x="5685600" y="3010774"/>
             <a:ext cx="284912" cy="225395"/>
           </a:xfrm>
           <a:prstGeom prst="chevron">
@@ -10770,8 +10670,8 @@
           <p:nvPr/>
         </p:nvSpPr>
         <p:spPr>
-          <a:xfrm rot="1740771">
-            <a:off x="4978074" y="2086220"/>
+          <a:xfrm>
+            <a:off x="5402058" y="2494412"/>
             <a:ext cx="838200" cy="609600"/>
           </a:xfrm>
           <a:prstGeom prst="chevron">
@@ -10813,7 +10713,7 @@
     </p:spTree>
     <p:extLst>
       <p:ext uri="{BB962C8B-B14F-4D97-AF65-F5344CB8AC3E}">
-        <p14:creationId xmlns:p14="http://schemas.microsoft.com/office/powerpoint/2010/main" val="2832570364"/>
+        <p14:creationId xmlns:p14="http://schemas.microsoft.com/office/powerpoint/2010/main" val="161682679"/>
       </p:ext>
     </p:extLst>
   </p:cSld>
@@ -10889,56 +10789,6 @@
       </p:sp>
       <p:sp>
         <p:nvSpPr>
-          <p:cNvPr id="10" name="Circular Arrow 9"/>
-          <p:cNvSpPr/>
-          <p:nvPr/>
-        </p:nvSpPr>
-        <p:spPr>
-          <a:xfrm rot="3945274">
-            <a:off x="3003772" y="1845505"/>
-            <a:ext cx="3343757" cy="3389667"/>
-          </a:xfrm>
-          <a:prstGeom prst="circularArrow">
-            <a:avLst>
-              <a:gd name="adj1" fmla="val 12500"/>
-              <a:gd name="adj2" fmla="val 1142319"/>
-              <a:gd name="adj3" fmla="val 20457681"/>
-              <a:gd name="adj4" fmla="val 2562463"/>
-              <a:gd name="adj5" fmla="val 12500"/>
-            </a:avLst>
-          </a:prstGeom>
-        </p:spPr>
-        <p:style>
-          <a:lnRef idx="2">
-            <a:schemeClr val="accent1">
-              <a:shade val="50000"/>
-            </a:schemeClr>
-          </a:lnRef>
-          <a:fillRef idx="1">
-            <a:schemeClr val="accent1"/>
-          </a:fillRef>
-          <a:effectRef idx="0">
-            <a:schemeClr val="accent1"/>
-          </a:effectRef>
-          <a:fontRef idx="minor">
-            <a:schemeClr val="lt1"/>
-          </a:fontRef>
-        </p:style>
-        <p:txBody>
-          <a:bodyPr rtlCol="0" anchor="ctr"/>
-          <a:lstStyle/>
-          <a:p>
-            <a:pPr algn="ctr"/>
-            <a:endParaRPr lang="en-US">
-              <a:solidFill>
-                <a:schemeClr val="tx1"/>
-              </a:solidFill>
-            </a:endParaRPr>
-          </a:p>
-        </p:txBody>
-      </p:sp>
-      <p:sp>
-        <p:nvSpPr>
           <p:cNvPr id="11" name="Oval 10"/>
           <p:cNvSpPr/>
           <p:nvPr/>
@@ -10997,7 +10847,7 @@
           <a:stretch/>
         </p:blipFill>
         <p:spPr bwMode="auto">
-          <a:xfrm rot="1249401">
+          <a:xfrm rot="19941172">
             <a:off x="2750806" y="4027354"/>
             <a:ext cx="1022446" cy="1265171"/>
           </a:xfrm>
@@ -11042,7 +10892,7 @@
           <p:nvPr/>
         </p:nvSpPr>
         <p:spPr>
-          <a:xfrm rot="837145">
+          <a:xfrm>
             <a:off x="4660940" y="1948362"/>
             <a:ext cx="838200" cy="609600"/>
           </a:xfrm>
@@ -11089,7 +10939,7 @@
           <p:nvPr/>
         </p:nvSpPr>
         <p:spPr>
-          <a:xfrm rot="19557574">
+          <a:xfrm rot="16200000">
             <a:off x="1977521" y="1728506"/>
             <a:ext cx="2345819" cy="1475546"/>
           </a:xfrm>
@@ -11136,7 +10986,7 @@
           <p:nvPr/>
         </p:nvSpPr>
         <p:spPr>
-          <a:xfrm rot="15957155">
+          <a:xfrm rot="16200000">
             <a:off x="2979494" y="3263700"/>
             <a:ext cx="838200" cy="609600"/>
           </a:xfrm>
@@ -11183,7 +11033,7 @@
           <p:nvPr/>
         </p:nvSpPr>
         <p:spPr>
-          <a:xfrm rot="12035387">
+          <a:xfrm rot="10800000">
             <a:off x="3557341" y="4466468"/>
             <a:ext cx="1245684" cy="1864204"/>
           </a:xfrm>
@@ -11230,7 +11080,7 @@
           <p:nvPr/>
         </p:nvSpPr>
         <p:spPr>
-          <a:xfrm rot="9477150">
+          <a:xfrm rot="10800000">
             <a:off x="4750052" y="4456385"/>
             <a:ext cx="838200" cy="609600"/>
           </a:xfrm>
@@ -11277,7 +11127,7 @@
           <p:nvPr/>
         </p:nvSpPr>
         <p:spPr>
-          <a:xfrm rot="7317133">
+          <a:xfrm rot="5400000">
             <a:off x="5392306" y="3953970"/>
             <a:ext cx="838200" cy="609600"/>
           </a:xfrm>
@@ -11324,7 +11174,7 @@
           <p:nvPr/>
         </p:nvSpPr>
         <p:spPr>
-          <a:xfrm rot="4256469">
+          <a:xfrm rot="5400000">
             <a:off x="5754059" y="3367050"/>
             <a:ext cx="284912" cy="225395"/>
           </a:xfrm>
@@ -11371,7 +11221,7 @@
           <p:nvPr/>
         </p:nvSpPr>
         <p:spPr>
-          <a:xfrm rot="2997159">
+          <a:xfrm>
             <a:off x="5337235" y="2403925"/>
             <a:ext cx="838200" cy="609600"/>
           </a:xfrm>
@@ -11414,7 +11264,7 @@
     </p:spTree>
     <p:extLst>
       <p:ext uri="{BB962C8B-B14F-4D97-AF65-F5344CB8AC3E}">
-        <p14:creationId xmlns:p14="http://schemas.microsoft.com/office/powerpoint/2010/main" val="3723198443"/>
+        <p14:creationId xmlns:p14="http://schemas.microsoft.com/office/powerpoint/2010/main" val="2118697738"/>
       </p:ext>
     </p:extLst>
   </p:cSld>
@@ -11570,56 +11420,6 @@
       </p:sp>
       <p:sp>
         <p:nvSpPr>
-          <p:cNvPr id="10" name="Circular Arrow 9"/>
-          <p:cNvSpPr/>
-          <p:nvPr/>
-        </p:nvSpPr>
-        <p:spPr>
-          <a:xfrm rot="3945274">
-            <a:off x="3003772" y="1845505"/>
-            <a:ext cx="3343757" cy="3389667"/>
-          </a:xfrm>
-          <a:prstGeom prst="circularArrow">
-            <a:avLst>
-              <a:gd name="adj1" fmla="val 12500"/>
-              <a:gd name="adj2" fmla="val 1142319"/>
-              <a:gd name="adj3" fmla="val 20457681"/>
-              <a:gd name="adj4" fmla="val 2562463"/>
-              <a:gd name="adj5" fmla="val 12500"/>
-            </a:avLst>
-          </a:prstGeom>
-        </p:spPr>
-        <p:style>
-          <a:lnRef idx="2">
-            <a:schemeClr val="accent1">
-              <a:shade val="50000"/>
-            </a:schemeClr>
-          </a:lnRef>
-          <a:fillRef idx="1">
-            <a:schemeClr val="accent1"/>
-          </a:fillRef>
-          <a:effectRef idx="0">
-            <a:schemeClr val="accent1"/>
-          </a:effectRef>
-          <a:fontRef idx="minor">
-            <a:schemeClr val="lt1"/>
-          </a:fontRef>
-        </p:style>
-        <p:txBody>
-          <a:bodyPr rtlCol="0" anchor="ctr"/>
-          <a:lstStyle/>
-          <a:p>
-            <a:pPr algn="ctr"/>
-            <a:endParaRPr lang="en-US">
-              <a:solidFill>
-                <a:schemeClr val="tx1"/>
-              </a:solidFill>
-            </a:endParaRPr>
-          </a:p>
-        </p:txBody>
-      </p:sp>
-      <p:sp>
-        <p:nvSpPr>
           <p:cNvPr id="11" name="Oval 10"/>
           <p:cNvSpPr/>
           <p:nvPr/>
@@ -11678,8 +11478,8 @@
           <a:stretch/>
         </p:blipFill>
         <p:spPr bwMode="auto">
-          <a:xfrm rot="18411361">
-            <a:off x="4898053" y="4601961"/>
+          <a:xfrm rot="19941172">
+            <a:off x="4641857" y="4684342"/>
             <a:ext cx="1022446" cy="1265171"/>
           </a:xfrm>
           <a:prstGeom prst="rect">
@@ -11723,8 +11523,8 @@
           <p:nvPr/>
         </p:nvSpPr>
         <p:spPr>
-          <a:xfrm rot="1390753">
-            <a:off x="4859638" y="2022963"/>
+          <a:xfrm>
+            <a:off x="4866253" y="2026097"/>
             <a:ext cx="838200" cy="609600"/>
           </a:xfrm>
           <a:prstGeom prst="chevron">
@@ -11770,8 +11570,8 @@
           <p:nvPr/>
         </p:nvSpPr>
         <p:spPr>
-          <a:xfrm rot="13951024">
-            <a:off x="2584842" y="4411135"/>
+          <a:xfrm rot="16200000">
+            <a:off x="2601074" y="4420596"/>
             <a:ext cx="2345819" cy="1475546"/>
           </a:xfrm>
           <a:prstGeom prst="chevron">
@@ -11817,7 +11617,7 @@
           <p:nvPr/>
         </p:nvSpPr>
         <p:spPr>
-          <a:xfrm rot="15106046">
+          <a:xfrm rot="16200000">
             <a:off x="3031179" y="3585390"/>
             <a:ext cx="838200" cy="609600"/>
           </a:xfrm>
@@ -11864,8 +11664,8 @@
           <p:nvPr/>
         </p:nvSpPr>
         <p:spPr>
-          <a:xfrm rot="8045617">
-            <a:off x="5601353" y="3830494"/>
+          <a:xfrm rot="10800000">
+            <a:off x="5659563" y="3756211"/>
             <a:ext cx="1245684" cy="1864204"/>
           </a:xfrm>
           <a:prstGeom prst="chevron">
@@ -11911,8 +11711,8 @@
           <p:nvPr/>
         </p:nvSpPr>
         <p:spPr>
-          <a:xfrm rot="5573224">
-            <a:off x="5612599" y="3329540"/>
+          <a:xfrm rot="10800000">
+            <a:off x="5612506" y="3330626"/>
             <a:ext cx="838200" cy="609600"/>
           </a:xfrm>
           <a:prstGeom prst="chevron">
@@ -11958,8 +11758,8 @@
           <p:nvPr/>
         </p:nvSpPr>
         <p:spPr>
-          <a:xfrm rot="4144531">
-            <a:off x="5546200" y="2789229"/>
+          <a:xfrm rot="5400000">
+            <a:off x="5576006" y="2888874"/>
             <a:ext cx="838200" cy="609600"/>
           </a:xfrm>
           <a:prstGeom prst="chevron">
@@ -12005,8 +11805,8 @@
           <p:nvPr/>
         </p:nvSpPr>
         <p:spPr>
-          <a:xfrm rot="2479297">
-            <a:off x="5579236" y="2789634"/>
+          <a:xfrm rot="5400000">
+            <a:off x="5589313" y="2806286"/>
             <a:ext cx="284912" cy="225395"/>
           </a:xfrm>
           <a:prstGeom prst="chevron">
@@ -12052,8 +11852,8 @@
           <p:nvPr/>
         </p:nvSpPr>
         <p:spPr>
-          <a:xfrm rot="2819439">
-            <a:off x="5293840" y="2351312"/>
+          <a:xfrm>
+            <a:off x="5298872" y="2357137"/>
             <a:ext cx="838200" cy="609600"/>
           </a:xfrm>
           <a:prstGeom prst="chevron">
@@ -12095,7 +11895,7 @@
     </p:spTree>
     <p:extLst>
       <p:ext uri="{BB962C8B-B14F-4D97-AF65-F5344CB8AC3E}">
-        <p14:creationId xmlns:p14="http://schemas.microsoft.com/office/powerpoint/2010/main" val="2154058062"/>
+        <p14:creationId xmlns:p14="http://schemas.microsoft.com/office/powerpoint/2010/main" val="245343115"/>
       </p:ext>
     </p:extLst>
   </p:cSld>
@@ -12171,56 +11971,6 @@
       </p:sp>
       <p:sp>
         <p:nvSpPr>
-          <p:cNvPr id="10" name="Circular Arrow 9"/>
-          <p:cNvSpPr/>
-          <p:nvPr/>
-        </p:nvSpPr>
-        <p:spPr>
-          <a:xfrm rot="3945274">
-            <a:off x="3003772" y="1845505"/>
-            <a:ext cx="3343757" cy="3389667"/>
-          </a:xfrm>
-          <a:prstGeom prst="circularArrow">
-            <a:avLst>
-              <a:gd name="adj1" fmla="val 12500"/>
-              <a:gd name="adj2" fmla="val 1142319"/>
-              <a:gd name="adj3" fmla="val 20457681"/>
-              <a:gd name="adj4" fmla="val 2562463"/>
-              <a:gd name="adj5" fmla="val 12500"/>
-            </a:avLst>
-          </a:prstGeom>
-        </p:spPr>
-        <p:style>
-          <a:lnRef idx="2">
-            <a:schemeClr val="accent1">
-              <a:shade val="50000"/>
-            </a:schemeClr>
-          </a:lnRef>
-          <a:fillRef idx="1">
-            <a:schemeClr val="accent1"/>
-          </a:fillRef>
-          <a:effectRef idx="0">
-            <a:schemeClr val="accent1"/>
-          </a:effectRef>
-          <a:fontRef idx="minor">
-            <a:schemeClr val="lt1"/>
-          </a:fontRef>
-        </p:style>
-        <p:txBody>
-          <a:bodyPr rtlCol="0" anchor="ctr"/>
-          <a:lstStyle/>
-          <a:p>
-            <a:pPr algn="ctr"/>
-            <a:endParaRPr lang="en-US">
-              <a:solidFill>
-                <a:schemeClr val="tx1"/>
-              </a:solidFill>
-            </a:endParaRPr>
-          </a:p>
-        </p:txBody>
-      </p:sp>
-      <p:sp>
-        <p:nvSpPr>
           <p:cNvPr id="11" name="Oval 10"/>
           <p:cNvSpPr/>
           <p:nvPr/>
@@ -12279,8 +12029,8 @@
           <a:stretch/>
         </p:blipFill>
         <p:spPr bwMode="auto">
-          <a:xfrm rot="20384714">
-            <a:off x="3856989" y="4703261"/>
+          <a:xfrm rot="19941172">
+            <a:off x="3792466" y="4689653"/>
             <a:ext cx="1022446" cy="1265171"/>
           </a:xfrm>
           <a:prstGeom prst="rect">
@@ -12324,8 +12074,8 @@
           <p:nvPr/>
         </p:nvSpPr>
         <p:spPr>
-          <a:xfrm rot="485047">
-            <a:off x="4529345" y="1917906"/>
+          <a:xfrm>
+            <a:off x="4535966" y="1919103"/>
             <a:ext cx="838200" cy="609600"/>
           </a:xfrm>
           <a:prstGeom prst="chevron">
@@ -12371,8 +12121,8 @@
           <p:nvPr/>
         </p:nvSpPr>
         <p:spPr>
-          <a:xfrm rot="14580790">
-            <a:off x="2304460" y="4209136"/>
+          <a:xfrm rot="16200000">
+            <a:off x="2247364" y="4157388"/>
             <a:ext cx="2345819" cy="1475546"/>
           </a:xfrm>
           <a:prstGeom prst="chevron">
@@ -12418,7 +12168,7 @@
           <p:nvPr/>
         </p:nvSpPr>
         <p:spPr>
-          <a:xfrm rot="15106046">
+          <a:xfrm rot="16200000">
             <a:off x="3031179" y="3585390"/>
             <a:ext cx="838200" cy="609600"/>
           </a:xfrm>
@@ -12465,8 +12215,8 @@
           <p:nvPr/>
         </p:nvSpPr>
         <p:spPr>
-          <a:xfrm rot="9922799">
-            <a:off x="4737759" y="4432675"/>
+          <a:xfrm rot="10800000">
+            <a:off x="4681074" y="4451496"/>
             <a:ext cx="1245684" cy="1864204"/>
           </a:xfrm>
           <a:prstGeom prst="chevron">
@@ -12512,8 +12262,8 @@
           <p:nvPr/>
         </p:nvSpPr>
         <p:spPr>
-          <a:xfrm rot="7716660">
-            <a:off x="5299454" y="4075880"/>
+          <a:xfrm rot="10800000">
+            <a:off x="5277229" y="4101130"/>
             <a:ext cx="838200" cy="609600"/>
           </a:xfrm>
           <a:prstGeom prst="chevron">
@@ -12559,8 +12309,8 @@
           <p:nvPr/>
         </p:nvSpPr>
         <p:spPr>
-          <a:xfrm rot="5908741">
-            <a:off x="5595361" y="3457104"/>
+          <a:xfrm rot="5400000">
+            <a:off x="5590191" y="3483515"/>
             <a:ext cx="838200" cy="609600"/>
           </a:xfrm>
           <a:prstGeom prst="chevron">
@@ -12606,8 +12356,8 @@
           <p:nvPr/>
         </p:nvSpPr>
         <p:spPr>
-          <a:xfrm rot="3200175">
-            <a:off x="5686149" y="3012309"/>
+          <a:xfrm rot="5400000">
+            <a:off x="5692087" y="3029358"/>
             <a:ext cx="284912" cy="225395"/>
           </a:xfrm>
           <a:prstGeom prst="chevron">
@@ -12653,8 +12403,8 @@
           <p:nvPr/>
         </p:nvSpPr>
         <p:spPr>
-          <a:xfrm rot="2292963">
-            <a:off x="5150149" y="2209536"/>
+          <a:xfrm>
+            <a:off x="5160378" y="2218279"/>
             <a:ext cx="838200" cy="609600"/>
           </a:xfrm>
           <a:prstGeom prst="chevron">
@@ -12696,7 +12446,7 @@
     </p:spTree>
     <p:extLst>
       <p:ext uri="{BB962C8B-B14F-4D97-AF65-F5344CB8AC3E}">
-        <p14:creationId xmlns:p14="http://schemas.microsoft.com/office/powerpoint/2010/main" val="2341596113"/>
+        <p14:creationId xmlns:p14="http://schemas.microsoft.com/office/powerpoint/2010/main" val="998988193"/>
       </p:ext>
     </p:extLst>
   </p:cSld>

</xml_diff>